<commit_message>
CSIS604 HW4 ppt modified:   CSIS604/projects/assignment_4/assignment_4_ppt.pptx
</commit_message>
<xml_diff>
--- a/CSIS604/projects/assignment_4/assignment_4_ppt.pptx
+++ b/CSIS604/projects/assignment_4/assignment_4_ppt.pptx
@@ -19,6 +19,8 @@
     <p:sldId id="267" r:id="rId14"/>
     <p:sldId id="268" r:id="rId15"/>
     <p:sldId id="269" r:id="rId16"/>
+    <p:sldId id="270" r:id="rId17"/>
+    <p:sldId id="271" r:id="rId18"/>
   </p:sldIdLst>
   <p:sldSz cx="10080625" cy="7559675"/>
   <p:notesSz cx="7772400" cy="10058400"/>
@@ -1959,7 +1961,7 @@
           <a:bodyPr lIns="0" rIns="0" tIns="0" bIns="0"/>
           <a:p>
             <a:pPr algn="r"/>
-            <a:fld id="{F8D2A37B-20FB-417F-A909-A94A831C44BA}" type="slidenum">
+            <a:fld id="{A08A0A6D-7835-4D0C-AF31-273719672772}" type="slidenum">
               <a:rPr b="0" lang="en-US" sz="1400" spc="-1" strike="noStrike">
                 <a:solidFill>
                   <a:srgbClr val="000000"/>
@@ -2400,7 +2402,7 @@
         </p:nvSpPr>
         <p:spPr>
           <a:xfrm>
-            <a:off x="457200" y="2834640"/>
+            <a:off x="504000" y="301320"/>
             <a:ext cx="9071640" cy="1262160"/>
           </a:xfrm>
           <a:prstGeom prst="rect">
@@ -2427,38 +2429,207 @@
                 </a:uFill>
                 <a:latin typeface="Arial"/>
               </a:rPr>
-              <a:t>MapReduce</a:t>
-            </a:r>
-            <a:r>
-              <a:rPr b="0" lang="en-US" sz="4400" spc="-1" strike="noStrike">
-                <a:solidFill>
-                  <a:srgbClr val="000000"/>
-                </a:solidFill>
-                <a:uFill>
-                  <a:solidFill>
-                    <a:srgbClr val="ffffff"/>
-                  </a:solidFill>
-                </a:uFill>
-                <a:latin typeface="Arial"/>
-              </a:rPr>
-              <a:t>
-</a:t>
-            </a:r>
-            <a:r>
-              <a:rPr b="0" lang="en-US" sz="4400" spc="-1" strike="noStrike">
-                <a:solidFill>
-                  <a:srgbClr val="000000"/>
-                </a:solidFill>
-                <a:uFill>
-                  <a:solidFill>
-                    <a:srgbClr val="ffffff"/>
-                  </a:solidFill>
-                </a:uFill>
-                <a:latin typeface="Arial"/>
-              </a:rPr>
-              <a:t>(MR)</a:t>
+              <a:t>GFS: Fault Tolerance</a:t>
             </a:r>
             <a:endParaRPr b="0" lang="en-US" sz="4400" spc="-1" strike="noStrike">
+              <a:solidFill>
+                <a:srgbClr val="000000"/>
+              </a:solidFill>
+              <a:uFill>
+                <a:solidFill>
+                  <a:srgbClr val="ffffff"/>
+                </a:solidFill>
+              </a:uFill>
+              <a:latin typeface="Arial"/>
+            </a:endParaRPr>
+          </a:p>
+        </p:txBody>
+      </p:sp>
+      <p:sp>
+        <p:nvSpPr>
+          <p:cNvPr id="106" name="TextShape 2"/>
+          <p:cNvSpPr txBox="1"/>
+          <p:nvPr/>
+        </p:nvSpPr>
+        <p:spPr>
+          <a:xfrm>
+            <a:off x="504000" y="1479960"/>
+            <a:ext cx="9071640" cy="5469480"/>
+          </a:xfrm>
+          <a:prstGeom prst="rect">
+            <a:avLst/>
+          </a:prstGeom>
+          <a:noFill/>
+          <a:ln>
+            <a:noFill/>
+          </a:ln>
+        </p:spPr>
+        <p:txBody>
+          <a:bodyPr lIns="0" rIns="0" tIns="0" bIns="0" anchor="ctr"/>
+          <a:p>
+            <a:pPr marL="216000" indent="-216000">
+              <a:buClr>
+                <a:srgbClr val="000000"/>
+              </a:buClr>
+              <a:buSzPct val="45000"/>
+              <a:buFont typeface="Wingdings" charset="2"/>
+              <a:buChar char=""/>
+            </a:pPr>
+            <a:r>
+              <a:rPr b="0" lang="en-US" sz="3200" spc="-1" strike="noStrike">
+                <a:solidFill>
+                  <a:srgbClr val="000000"/>
+                </a:solidFill>
+                <a:uFill>
+                  <a:solidFill>
+                    <a:srgbClr val="ffffff"/>
+                  </a:solidFill>
+                </a:uFill>
+                <a:latin typeface="Arial"/>
+              </a:rPr>
+              <a:t>What happens when a node fails to return a chunk of a file?</a:t>
+            </a:r>
+            <a:endParaRPr b="0" lang="en-US" sz="3200" spc="-1" strike="noStrike">
+              <a:solidFill>
+                <a:srgbClr val="000000"/>
+              </a:solidFill>
+              <a:uFill>
+                <a:solidFill>
+                  <a:srgbClr val="ffffff"/>
+                </a:solidFill>
+              </a:uFill>
+              <a:latin typeface="Arial"/>
+            </a:endParaRPr>
+          </a:p>
+          <a:p>
+            <a:pPr lvl="2" marL="648000" indent="-216000">
+              <a:buClr>
+                <a:srgbClr val="000000"/>
+              </a:buClr>
+              <a:buSzPct val="45000"/>
+              <a:buFont typeface="Wingdings" charset="2"/>
+              <a:buChar char=""/>
+            </a:pPr>
+            <a:r>
+              <a:rPr b="0" lang="en-US" sz="3200" spc="-1" strike="noStrike">
+                <a:solidFill>
+                  <a:srgbClr val="000000"/>
+                </a:solidFill>
+                <a:uFill>
+                  <a:solidFill>
+                    <a:srgbClr val="ffffff"/>
+                  </a:solidFill>
+                </a:uFill>
+                <a:latin typeface="Arial"/>
+              </a:rPr>
+              <a:t>When a file is written to the system, the chunks of the file are is replicated across several other nodes.</a:t>
+            </a:r>
+            <a:endParaRPr b="0" lang="en-US" sz="3200" spc="-1" strike="noStrike">
+              <a:solidFill>
+                <a:srgbClr val="000000"/>
+              </a:solidFill>
+              <a:uFill>
+                <a:solidFill>
+                  <a:srgbClr val="ffffff"/>
+                </a:solidFill>
+              </a:uFill>
+              <a:latin typeface="Arial"/>
+            </a:endParaRPr>
+          </a:p>
+          <a:p>
+            <a:pPr lvl="2" marL="648000" indent="-216000">
+              <a:buClr>
+                <a:srgbClr val="000000"/>
+              </a:buClr>
+              <a:buSzPct val="45000"/>
+              <a:buFont typeface="Wingdings" charset="2"/>
+              <a:buChar char=""/>
+            </a:pPr>
+            <a:r>
+              <a:rPr b="0" lang="en-US" sz="3200" spc="-1" strike="noStrike">
+                <a:solidFill>
+                  <a:srgbClr val="000000"/>
+                </a:solidFill>
+                <a:uFill>
+                  <a:solidFill>
+                    <a:srgbClr val="ffffff"/>
+                  </a:solidFill>
+                </a:uFill>
+                <a:latin typeface="Arial"/>
+              </a:rPr>
+              <a:t>If a failure on one node occurs when retrieving a chunk, there are other nodes that will now have the data store in duplicate.</a:t>
+            </a:r>
+            <a:endParaRPr b="0" lang="en-US" sz="3200" spc="-1" strike="noStrike">
+              <a:solidFill>
+                <a:srgbClr val="000000"/>
+              </a:solidFill>
+              <a:uFill>
+                <a:solidFill>
+                  <a:srgbClr val="ffffff"/>
+                </a:solidFill>
+              </a:uFill>
+              <a:latin typeface="Arial"/>
+            </a:endParaRPr>
+          </a:p>
+          <a:p>
+            <a:pPr lvl="2" marL="648000" indent="-216000">
+              <a:buClr>
+                <a:srgbClr val="000000"/>
+              </a:buClr>
+              <a:buSzPct val="45000"/>
+              <a:buFont typeface="Wingdings" charset="2"/>
+              <a:buChar char=""/>
+            </a:pPr>
+            <a:r>
+              <a:rPr b="0" lang="en-US" sz="3200" spc="-1" strike="noStrike">
+                <a:solidFill>
+                  <a:srgbClr val="000000"/>
+                </a:solidFill>
+                <a:uFill>
+                  <a:solidFill>
+                    <a:srgbClr val="ffffff"/>
+                  </a:solidFill>
+                </a:uFill>
+                <a:latin typeface="Arial"/>
+              </a:rPr>
+              <a:t>These supplementary nodes can now return the serve the file chunk instead of the faulty node.</a:t>
+            </a:r>
+            <a:endParaRPr b="0" lang="en-US" sz="3200" spc="-1" strike="noStrike">
+              <a:solidFill>
+                <a:srgbClr val="000000"/>
+              </a:solidFill>
+              <a:uFill>
+                <a:solidFill>
+                  <a:srgbClr val="ffffff"/>
+                </a:solidFill>
+              </a:uFill>
+              <a:latin typeface="Arial"/>
+            </a:endParaRPr>
+          </a:p>
+          <a:p>
+            <a:pPr marL="216000" indent="-216000">
+              <a:buClr>
+                <a:srgbClr val="000000"/>
+              </a:buClr>
+              <a:buSzPct val="45000"/>
+              <a:buFont typeface="Wingdings" charset="2"/>
+              <a:buChar char=""/>
+            </a:pPr>
+            <a:r>
+              <a:rPr b="0" lang="en-US" sz="3200" spc="-1" strike="noStrike">
+                <a:solidFill>
+                  <a:srgbClr val="000000"/>
+                </a:solidFill>
+                <a:uFill>
+                  <a:solidFill>
+                    <a:srgbClr val="ffffff"/>
+                  </a:solidFill>
+                </a:uFill>
+                <a:latin typeface="Arial"/>
+              </a:rPr>
+              <a:t> </a:t>
+            </a:r>
+            <a:endParaRPr b="0" lang="en-US" sz="3200" spc="-1" strike="noStrike">
               <a:solidFill>
                 <a:srgbClr val="000000"/>
               </a:solidFill>
@@ -2523,13 +2694,13 @@
       </p:grpSpPr>
       <p:sp>
         <p:nvSpPr>
-          <p:cNvPr id="106" name="TextShape 1"/>
+          <p:cNvPr id="107" name="TextShape 1"/>
           <p:cNvSpPr txBox="1"/>
           <p:nvPr/>
         </p:nvSpPr>
         <p:spPr>
           <a:xfrm>
-            <a:off x="504000" y="301320"/>
+            <a:off x="457200" y="2834640"/>
             <a:ext cx="9071640" cy="1262160"/>
           </a:xfrm>
           <a:prstGeom prst="rect">
@@ -2556,137 +2727,38 @@
                 </a:uFill>
                 <a:latin typeface="Arial"/>
               </a:rPr>
-              <a:t>MR: The Motivation behind it</a:t>
+              <a:t>MapReduce</a:t>
+            </a:r>
+            <a:r>
+              <a:rPr b="0" lang="en-US" sz="4400" spc="-1" strike="noStrike">
+                <a:solidFill>
+                  <a:srgbClr val="000000"/>
+                </a:solidFill>
+                <a:uFill>
+                  <a:solidFill>
+                    <a:srgbClr val="ffffff"/>
+                  </a:solidFill>
+                </a:uFill>
+                <a:latin typeface="Arial"/>
+              </a:rPr>
+              <a:t>
+</a:t>
+            </a:r>
+            <a:r>
+              <a:rPr b="0" lang="en-US" sz="4400" spc="-1" strike="noStrike">
+                <a:solidFill>
+                  <a:srgbClr val="000000"/>
+                </a:solidFill>
+                <a:uFill>
+                  <a:solidFill>
+                    <a:srgbClr val="ffffff"/>
+                  </a:solidFill>
+                </a:uFill>
+                <a:latin typeface="Arial"/>
+              </a:rPr>
+              <a:t>(MR)</a:t>
             </a:r>
             <a:endParaRPr b="0" lang="en-US" sz="4400" spc="-1" strike="noStrike">
-              <a:solidFill>
-                <a:srgbClr val="000000"/>
-              </a:solidFill>
-              <a:uFill>
-                <a:solidFill>
-                  <a:srgbClr val="ffffff"/>
-                </a:solidFill>
-              </a:uFill>
-              <a:latin typeface="Arial"/>
-            </a:endParaRPr>
-          </a:p>
-        </p:txBody>
-      </p:sp>
-      <p:sp>
-        <p:nvSpPr>
-          <p:cNvPr id="107" name="TextShape 2"/>
-          <p:cNvSpPr txBox="1"/>
-          <p:nvPr/>
-        </p:nvSpPr>
-        <p:spPr>
-          <a:xfrm>
-            <a:off x="504000" y="1682280"/>
-            <a:ext cx="9071640" cy="4557960"/>
-          </a:xfrm>
-          <a:prstGeom prst="rect">
-            <a:avLst/>
-          </a:prstGeom>
-          <a:noFill/>
-          <a:ln>
-            <a:noFill/>
-          </a:ln>
-        </p:spPr>
-        <p:txBody>
-          <a:bodyPr lIns="0" rIns="0" tIns="0" bIns="0" anchor="ctr"/>
-          <a:p>
-            <a:pPr marL="216000" indent="-216000">
-              <a:buClr>
-                <a:srgbClr val="000000"/>
-              </a:buClr>
-              <a:buSzPct val="45000"/>
-              <a:buFont typeface="Wingdings" charset="2"/>
-              <a:buChar char=""/>
-            </a:pPr>
-            <a:r>
-              <a:rPr b="0" lang="en-US" sz="3200" spc="-1" strike="noStrike">
-                <a:solidFill>
-                  <a:srgbClr val="000000"/>
-                </a:solidFill>
-                <a:uFill>
-                  <a:solidFill>
-                    <a:srgbClr val="ffffff"/>
-                  </a:solidFill>
-                </a:uFill>
-                <a:latin typeface="Arial"/>
-              </a:rPr>
-              <a:t>Sometimes, on a distributed file system like GFS, calculations need to be done on the data that is stored. </a:t>
-            </a:r>
-            <a:endParaRPr b="0" lang="en-US" sz="3200" spc="-1" strike="noStrike">
-              <a:solidFill>
-                <a:srgbClr val="000000"/>
-              </a:solidFill>
-              <a:uFill>
-                <a:solidFill>
-                  <a:srgbClr val="ffffff"/>
-                </a:solidFill>
-              </a:uFill>
-              <a:latin typeface="Arial"/>
-            </a:endParaRPr>
-          </a:p>
-          <a:p>
-            <a:pPr marL="216000" indent="-216000">
-              <a:buClr>
-                <a:srgbClr val="000000"/>
-              </a:buClr>
-              <a:buSzPct val="45000"/>
-              <a:buFont typeface="Wingdings" charset="2"/>
-              <a:buChar char=""/>
-            </a:pPr>
-            <a:r>
-              <a:rPr b="0" lang="en-US" sz="3200" spc="-1" strike="noStrike">
-                <a:solidFill>
-                  <a:srgbClr val="000000"/>
-                </a:solidFill>
-                <a:uFill>
-                  <a:solidFill>
-                    <a:srgbClr val="ffffff"/>
-                  </a:solidFill>
-                </a:uFill>
-                <a:latin typeface="Arial"/>
-              </a:rPr>
-              <a:t>Traditionally, The files would have been served whole by GFS and then the operations would have taken place on the whole file. However, this can be very slow for large files</a:t>
-            </a:r>
-            <a:endParaRPr b="0" lang="en-US" sz="3200" spc="-1" strike="noStrike">
-              <a:solidFill>
-                <a:srgbClr val="000000"/>
-              </a:solidFill>
-              <a:uFill>
-                <a:solidFill>
-                  <a:srgbClr val="ffffff"/>
-                </a:solidFill>
-              </a:uFill>
-              <a:latin typeface="Arial"/>
-            </a:endParaRPr>
-          </a:p>
-          <a:p>
-            <a:pPr marL="216000" indent="-216000">
-              <a:buClr>
-                <a:srgbClr val="000000"/>
-              </a:buClr>
-              <a:buSzPct val="45000"/>
-              <a:buFont typeface="Wingdings" charset="2"/>
-              <a:buChar char=""/>
-            </a:pPr>
-            <a:r>
-              <a:rPr b="0" lang="en-US" sz="3200" spc="-1" strike="noStrike">
-                <a:solidFill>
-                  <a:srgbClr val="000000"/>
-                </a:solidFill>
-                <a:uFill>
-                  <a:solidFill>
-                    <a:srgbClr val="ffffff"/>
-                  </a:solidFill>
-                </a:uFill>
-                <a:latin typeface="Arial"/>
-              </a:rPr>
-              <a:t>Again, instead of using a supercomputer, to do calculations, the calculations needed to be distributed. </a:t>
-            </a:r>
-            <a:endParaRPr b="0" lang="en-US" sz="3200" spc="-1" strike="noStrike">
               <a:solidFill>
                 <a:srgbClr val="000000"/>
               </a:solidFill>
@@ -2784,7 +2856,7 @@
                 </a:uFill>
                 <a:latin typeface="Arial"/>
               </a:rPr>
-              <a:t>MR: How is it built?</a:t>
+              <a:t>MR: The Motivation behind it</a:t>
             </a:r>
             <a:endParaRPr b="0" lang="en-US" sz="4400" spc="-1" strike="noStrike">
               <a:solidFill>
@@ -2808,8 +2880,8 @@
         </p:nvSpPr>
         <p:spPr>
           <a:xfrm>
-            <a:off x="504000" y="1769040"/>
-            <a:ext cx="9071640" cy="4384440"/>
+            <a:off x="504000" y="1682280"/>
+            <a:ext cx="9071640" cy="4557960"/>
           </a:xfrm>
           <a:prstGeom prst="rect">
             <a:avLst/>
@@ -2842,7 +2914,7 @@
                 </a:uFill>
                 <a:latin typeface="Arial"/>
               </a:rPr>
-              <a:t>Similarly to GFS, it is comprised of nodes and a master node.</a:t>
+              <a:t>Sometimes, on a distributed file system like GFS, calculations need to be done on the data that is stored. </a:t>
             </a:r>
             <a:endParaRPr b="0" lang="en-US" sz="3200" spc="-1" strike="noStrike">
               <a:solidFill>
@@ -2877,7 +2949,7 @@
                 </a:uFill>
                 <a:latin typeface="Arial"/>
               </a:rPr>
-              <a:t>Processing code is pushed out to every node, so that each node can process the data that it is storing</a:t>
+              <a:t>Traditionally, The files would have been served whole by GFS and then the operations would have taken place on the whole file. However, this can be very slow for large files</a:t>
             </a:r>
             <a:endParaRPr b="0" lang="en-US" sz="3200" spc="-1" strike="noStrike">
               <a:solidFill>
@@ -2912,35 +2984,7 @@
                 </a:uFill>
                 <a:latin typeface="Arial"/>
               </a:rPr>
-              <a:t>A </a:t>
-            </a:r>
-            <a:r>
-              <a:rPr b="0" lang="en-US" sz="3200" spc="-1" strike="noStrike">
-                <a:solidFill>
-                  <a:srgbClr val="ff3333"/>
-                </a:solidFill>
-                <a:uFill>
-                  <a:solidFill>
-                    <a:srgbClr val="ffffff"/>
-                  </a:solidFill>
-                </a:uFill>
-                <a:latin typeface="Arial"/>
-              </a:rPr>
-              <a:t>master node</a:t>
-            </a:r>
-            <a:r>
-              <a:rPr b="0" lang="en-US" sz="3200" spc="-1" strike="noStrike">
-                <a:solidFill>
-                  <a:srgbClr val="000000"/>
-                </a:solidFill>
-                <a:uFill>
-                  <a:solidFill>
-                    <a:srgbClr val="ffffff"/>
-                  </a:solidFill>
-                </a:uFill>
-                <a:latin typeface="Arial"/>
-              </a:rPr>
-              <a:t> connects the nodes and organizes the process execution across the cluster</a:t>
+              <a:t>Again, instead of using a supercomputer, to do calculations, the calculations needed to be distributed. </a:t>
             </a:r>
             <a:endParaRPr b="0" lang="en-US" sz="3200" spc="-1" strike="noStrike">
               <a:solidFill>
@@ -3040,7 +3084,7 @@
                 </a:uFill>
                 <a:latin typeface="Arial"/>
               </a:rPr>
-              <a:t>MR: How does it work?</a:t>
+              <a:t>MR: How is it built?</a:t>
             </a:r>
             <a:endParaRPr b="0" lang="en-US" sz="4400" spc="-1" strike="noStrike">
               <a:solidFill>
@@ -3064,8 +3108,8 @@
         </p:nvSpPr>
         <p:spPr>
           <a:xfrm>
-            <a:off x="504000" y="1328400"/>
-            <a:ext cx="9071640" cy="2379240"/>
+            <a:off x="504000" y="1769040"/>
+            <a:ext cx="9071640" cy="4384440"/>
           </a:xfrm>
           <a:prstGeom prst="rect">
             <a:avLst/>
@@ -3087,899 +3131,131 @@
               <a:buChar char=""/>
             </a:pPr>
             <a:r>
-              <a:rPr b="0" lang="en-US" sz="2400" spc="-1" strike="noStrike">
-                <a:solidFill>
-                  <a:srgbClr val="000000"/>
-                </a:solidFill>
-                <a:uFill>
-                  <a:solidFill>
-                    <a:srgbClr val="ffffff"/>
-                  </a:solidFill>
-                </a:uFill>
-                <a:latin typeface="Arial"/>
-              </a:rPr>
-              <a:t>Calculation Request:</a:t>
-            </a:r>
-            <a:endParaRPr b="0" lang="en-US" sz="2400" spc="-1" strike="noStrike">
-              <a:solidFill>
-                <a:srgbClr val="000000"/>
-              </a:solidFill>
-              <a:uFill>
-                <a:solidFill>
-                  <a:srgbClr val="ffffff"/>
-                </a:solidFill>
-              </a:uFill>
-              <a:latin typeface="Arial"/>
-            </a:endParaRPr>
-          </a:p>
-          <a:p>
-            <a:pPr lvl="1" marL="432000" indent="-216000">
+              <a:rPr b="0" lang="en-US" sz="3200" spc="-1" strike="noStrike">
+                <a:solidFill>
+                  <a:srgbClr val="000000"/>
+                </a:solidFill>
+                <a:uFill>
+                  <a:solidFill>
+                    <a:srgbClr val="ffffff"/>
+                  </a:solidFill>
+                </a:uFill>
+                <a:latin typeface="Arial"/>
+              </a:rPr>
+              <a:t>Similarly to GFS, it is comprised of nodes and a master node.</a:t>
+            </a:r>
+            <a:endParaRPr b="0" lang="en-US" sz="3200" spc="-1" strike="noStrike">
+              <a:solidFill>
+                <a:srgbClr val="000000"/>
+              </a:solidFill>
+              <a:uFill>
+                <a:solidFill>
+                  <a:srgbClr val="ffffff"/>
+                </a:solidFill>
+              </a:uFill>
+              <a:latin typeface="Arial"/>
+            </a:endParaRPr>
+          </a:p>
+          <a:p>
+            <a:pPr marL="216000" indent="-216000">
               <a:buClr>
                 <a:srgbClr val="000000"/>
               </a:buClr>
-              <a:buFont typeface="StarSymbol"/>
-              <a:buAutoNum type="arabicParenR"/>
+              <a:buSzPct val="45000"/>
+              <a:buFont typeface="Wingdings" charset="2"/>
+              <a:buChar char=""/>
             </a:pPr>
             <a:r>
-              <a:rPr b="0" lang="en-US" sz="2400" spc="-1" strike="noStrike">
-                <a:solidFill>
-                  <a:srgbClr val="000000"/>
-                </a:solidFill>
-                <a:uFill>
-                  <a:solidFill>
-                    <a:srgbClr val="ffffff"/>
-                  </a:solidFill>
-                </a:uFill>
-                <a:latin typeface="Arial"/>
-              </a:rPr>
-              <a:t>Client asks the system for a calculation on some files that are on a distributed system</a:t>
-            </a:r>
-            <a:endParaRPr b="0" lang="en-US" sz="2400" spc="-1" strike="noStrike">
-              <a:solidFill>
-                <a:srgbClr val="000000"/>
-              </a:solidFill>
-              <a:uFill>
-                <a:solidFill>
-                  <a:srgbClr val="ffffff"/>
-                </a:solidFill>
-              </a:uFill>
-              <a:latin typeface="Arial"/>
-            </a:endParaRPr>
-          </a:p>
-          <a:p>
-            <a:pPr lvl="1" marL="432000" indent="-216000">
+              <a:rPr b="0" lang="en-US" sz="3200" spc="-1" strike="noStrike">
+                <a:solidFill>
+                  <a:srgbClr val="000000"/>
+                </a:solidFill>
+                <a:uFill>
+                  <a:solidFill>
+                    <a:srgbClr val="ffffff"/>
+                  </a:solidFill>
+                </a:uFill>
+                <a:latin typeface="Arial"/>
+              </a:rPr>
+              <a:t>Processing code is pushed out to every node, so that each node can process the data that it is storing</a:t>
+            </a:r>
+            <a:endParaRPr b="0" lang="en-US" sz="3200" spc="-1" strike="noStrike">
+              <a:solidFill>
+                <a:srgbClr val="000000"/>
+              </a:solidFill>
+              <a:uFill>
+                <a:solidFill>
+                  <a:srgbClr val="ffffff"/>
+                </a:solidFill>
+              </a:uFill>
+              <a:latin typeface="Arial"/>
+            </a:endParaRPr>
+          </a:p>
+          <a:p>
+            <a:pPr marL="216000" indent="-216000">
               <a:buClr>
                 <a:srgbClr val="000000"/>
               </a:buClr>
-              <a:buFont typeface="StarSymbol"/>
-              <a:buAutoNum type="arabicParenR"/>
+              <a:buSzPct val="45000"/>
+              <a:buFont typeface="Wingdings" charset="2"/>
+              <a:buChar char=""/>
             </a:pPr>
             <a:r>
-              <a:rPr b="0" lang="en-US" sz="2400" spc="-1" strike="noStrike">
-                <a:solidFill>
-                  <a:srgbClr val="000000"/>
-                </a:solidFill>
-                <a:uFill>
-                  <a:solidFill>
-                    <a:srgbClr val="ffffff"/>
-                  </a:solidFill>
-                </a:uFill>
-                <a:latin typeface="Arial"/>
-              </a:rPr>
-              <a:t>Master node creates contacts the closest node with the correct file chunk(s)</a:t>
-            </a:r>
-            <a:endParaRPr b="0" lang="en-US" sz="2400" spc="-1" strike="noStrike">
-              <a:solidFill>
-                <a:srgbClr val="000000"/>
-              </a:solidFill>
-              <a:uFill>
-                <a:solidFill>
-                  <a:srgbClr val="ffffff"/>
-                </a:solidFill>
-              </a:uFill>
-              <a:latin typeface="Arial"/>
-            </a:endParaRPr>
-          </a:p>
-          <a:p>
-            <a:pPr lvl="1" marL="432000" indent="-216000">
-              <a:buClr>
-                <a:srgbClr val="000000"/>
-              </a:buClr>
-              <a:buFont typeface="StarSymbol"/>
-              <a:buAutoNum type="arabicParenR"/>
-            </a:pPr>
-            <a:r>
-              <a:rPr b="0" lang="en-US" sz="2400" spc="-1" strike="noStrike">
-                <a:solidFill>
-                  <a:srgbClr val="000000"/>
-                </a:solidFill>
-                <a:uFill>
-                  <a:solidFill>
-                    <a:srgbClr val="ffffff"/>
-                  </a:solidFill>
-                </a:uFill>
-                <a:latin typeface="Arial"/>
-              </a:rPr>
-              <a:t>The calculation code on the individual nodes executes the request on the file chunks and returns the results</a:t>
-            </a:r>
-            <a:endParaRPr b="0" lang="en-US" sz="2400" spc="-1" strike="noStrike">
-              <a:solidFill>
-                <a:srgbClr val="000000"/>
-              </a:solidFill>
-              <a:uFill>
-                <a:solidFill>
-                  <a:srgbClr val="ffffff"/>
-                </a:solidFill>
-              </a:uFill>
-              <a:latin typeface="Arial"/>
-            </a:endParaRPr>
-          </a:p>
-        </p:txBody>
-      </p:sp>
-      <p:sp>
-        <p:nvSpPr>
-          <p:cNvPr id="112" name="CustomShape 3"/>
-          <p:cNvSpPr/>
-          <p:nvPr/>
-        </p:nvSpPr>
-        <p:spPr>
-          <a:xfrm>
-            <a:off x="365760" y="4857480"/>
-            <a:ext cx="1828800" cy="1097280"/>
-          </a:xfrm>
-          <a:prstGeom prst="ellipse">
-            <a:avLst/>
-          </a:prstGeom>
-          <a:noFill/>
-          <a:ln>
-            <a:solidFill>
-              <a:srgbClr val="3465a4"/>
-            </a:solidFill>
-          </a:ln>
-        </p:spPr>
-        <p:style>
-          <a:lnRef idx="0"/>
-          <a:fillRef idx="0"/>
-          <a:effectRef idx="0"/>
-          <a:fontRef idx="minor"/>
-        </p:style>
-        <p:txBody>
-          <a:bodyPr wrap="none" lIns="90000" rIns="90000" tIns="45000" bIns="45000" anchor="ctr"/>
-          <a:p>
-            <a:pPr algn="ctr"/>
-            <a:r>
-              <a:rPr b="0" lang="en-US" sz="1800" spc="-1" strike="noStrike">
-                <a:solidFill>
-                  <a:srgbClr val="000000"/>
-                </a:solidFill>
-                <a:uFill>
-                  <a:solidFill>
-                    <a:srgbClr val="ffffff"/>
-                  </a:solidFill>
-                </a:uFill>
-                <a:latin typeface="Arial"/>
-              </a:rPr>
-              <a:t>Client(s)</a:t>
-            </a:r>
-            <a:endParaRPr b="0" lang="en-US" sz="1800" spc="-1" strike="noStrike">
-              <a:solidFill>
-                <a:srgbClr val="000000"/>
-              </a:solidFill>
-              <a:uFill>
-                <a:solidFill>
-                  <a:srgbClr val="ffffff"/>
-                </a:solidFill>
-              </a:uFill>
-              <a:latin typeface="Arial"/>
-            </a:endParaRPr>
-          </a:p>
-        </p:txBody>
-      </p:sp>
-      <p:sp>
-        <p:nvSpPr>
-          <p:cNvPr id="113" name="CustomShape 4"/>
-          <p:cNvSpPr/>
-          <p:nvPr/>
-        </p:nvSpPr>
-        <p:spPr>
-          <a:xfrm>
-            <a:off x="3566160" y="4674600"/>
-            <a:ext cx="2194560" cy="1482480"/>
-          </a:xfrm>
-          <a:prstGeom prst="rect">
-            <a:avLst/>
-          </a:prstGeom>
-          <a:noFill/>
-          <a:ln>
-            <a:solidFill>
-              <a:srgbClr val="3465a4"/>
-            </a:solidFill>
-          </a:ln>
-        </p:spPr>
-        <p:style>
-          <a:lnRef idx="0"/>
-          <a:fillRef idx="0"/>
-          <a:effectRef idx="0"/>
-          <a:fontRef idx="minor"/>
-        </p:style>
-        <p:txBody>
-          <a:bodyPr wrap="none" lIns="90000" rIns="90000" tIns="45000" bIns="45000" anchor="ctr"/>
-          <a:p>
-            <a:pPr algn="ctr"/>
-            <a:r>
-              <a:rPr b="0" lang="en-US" sz="1800" spc="-1" strike="noStrike">
-                <a:solidFill>
-                  <a:srgbClr val="000000"/>
-                </a:solidFill>
-                <a:uFill>
-                  <a:solidFill>
-                    <a:srgbClr val="ffffff"/>
-                  </a:solidFill>
-                </a:uFill>
-                <a:latin typeface="Arial"/>
-              </a:rPr>
-              <a:t>MASTER</a:t>
-            </a:r>
-            <a:endParaRPr b="0" lang="en-US" sz="1800" spc="-1" strike="noStrike">
-              <a:solidFill>
-                <a:srgbClr val="000000"/>
-              </a:solidFill>
-              <a:uFill>
-                <a:solidFill>
-                  <a:srgbClr val="ffffff"/>
-                </a:solidFill>
-              </a:uFill>
-              <a:latin typeface="Arial"/>
-            </a:endParaRPr>
-          </a:p>
-          <a:p>
-            <a:pPr algn="ctr"/>
-            <a:endParaRPr b="0" lang="en-US" sz="1800" spc="-1" strike="noStrike">
-              <a:solidFill>
-                <a:srgbClr val="000000"/>
-              </a:solidFill>
-              <a:uFill>
-                <a:solidFill>
-                  <a:srgbClr val="ffffff"/>
-                </a:solidFill>
-              </a:uFill>
-              <a:latin typeface="Arial"/>
-            </a:endParaRPr>
-          </a:p>
-          <a:p>
-            <a:pPr algn="ctr"/>
-            <a:r>
-              <a:rPr b="0" lang="en-US" sz="1800" spc="-1" strike="noStrike">
-                <a:solidFill>
-                  <a:srgbClr val="000000"/>
-                </a:solidFill>
-                <a:uFill>
-                  <a:solidFill>
-                    <a:srgbClr val="ffffff"/>
-                  </a:solidFill>
-                </a:uFill>
-                <a:latin typeface="Arial"/>
-              </a:rPr>
-              <a:t>File_a: Node 1</a:t>
-            </a:r>
-            <a:endParaRPr b="0" lang="en-US" sz="1800" spc="-1" strike="noStrike">
-              <a:solidFill>
-                <a:srgbClr val="000000"/>
-              </a:solidFill>
-              <a:uFill>
-                <a:solidFill>
-                  <a:srgbClr val="ffffff"/>
-                </a:solidFill>
-              </a:uFill>
-              <a:latin typeface="Arial"/>
-            </a:endParaRPr>
-          </a:p>
-          <a:p>
-            <a:pPr algn="ctr"/>
-            <a:r>
-              <a:rPr b="0" lang="en-US" sz="1800" spc="-1" strike="noStrike">
-                <a:solidFill>
-                  <a:srgbClr val="000000"/>
-                </a:solidFill>
-                <a:uFill>
-                  <a:solidFill>
-                    <a:srgbClr val="ffffff"/>
-                  </a:solidFill>
-                </a:uFill>
-                <a:latin typeface="Arial"/>
-              </a:rPr>
-              <a:t>File_b: Node 2</a:t>
-            </a:r>
-            <a:endParaRPr b="0" lang="en-US" sz="1800" spc="-1" strike="noStrike">
-              <a:solidFill>
-                <a:srgbClr val="000000"/>
-              </a:solidFill>
-              <a:uFill>
-                <a:solidFill>
-                  <a:srgbClr val="ffffff"/>
-                </a:solidFill>
-              </a:uFill>
-              <a:latin typeface="Arial"/>
-            </a:endParaRPr>
-          </a:p>
-        </p:txBody>
-      </p:sp>
-      <p:sp>
-        <p:nvSpPr>
-          <p:cNvPr id="114" name="CustomShape 5"/>
-          <p:cNvSpPr/>
-          <p:nvPr/>
-        </p:nvSpPr>
-        <p:spPr>
-          <a:xfrm>
-            <a:off x="7223760" y="3887640"/>
-            <a:ext cx="1920240" cy="822960"/>
-          </a:xfrm>
-          <a:prstGeom prst="rect">
-            <a:avLst/>
-          </a:prstGeom>
-          <a:noFill/>
-          <a:ln>
-            <a:solidFill>
-              <a:srgbClr val="3465a4"/>
-            </a:solidFill>
-          </a:ln>
-        </p:spPr>
-        <p:style>
-          <a:lnRef idx="0"/>
-          <a:fillRef idx="0"/>
-          <a:effectRef idx="0"/>
-          <a:fontRef idx="minor"/>
-        </p:style>
-        <p:txBody>
-          <a:bodyPr wrap="none" lIns="90000" rIns="90000" tIns="45000" bIns="45000" anchor="ctr"/>
-          <a:p>
-            <a:pPr algn="ctr"/>
-            <a:r>
-              <a:rPr b="0" lang="en-US" sz="1800" spc="-1" strike="noStrike">
-                <a:solidFill>
-                  <a:srgbClr val="000000"/>
-                </a:solidFill>
-                <a:uFill>
-                  <a:solidFill>
-                    <a:srgbClr val="ffffff"/>
-                  </a:solidFill>
-                </a:uFill>
-                <a:latin typeface="Arial"/>
-              </a:rPr>
-              <a:t>Node 1</a:t>
-            </a:r>
-            <a:endParaRPr b="0" lang="en-US" sz="1800" spc="-1" strike="noStrike">
-              <a:solidFill>
-                <a:srgbClr val="000000"/>
-              </a:solidFill>
-              <a:uFill>
-                <a:solidFill>
-                  <a:srgbClr val="ffffff"/>
-                </a:solidFill>
-              </a:uFill>
-              <a:latin typeface="Arial"/>
-            </a:endParaRPr>
-          </a:p>
-        </p:txBody>
-      </p:sp>
-      <p:sp>
-        <p:nvSpPr>
-          <p:cNvPr id="115" name="CustomShape 6"/>
-          <p:cNvSpPr/>
-          <p:nvPr/>
-        </p:nvSpPr>
-        <p:spPr>
-          <a:xfrm>
-            <a:off x="7223760" y="4984920"/>
-            <a:ext cx="1920240" cy="822960"/>
-          </a:xfrm>
-          <a:prstGeom prst="rect">
-            <a:avLst/>
-          </a:prstGeom>
-          <a:noFill/>
-          <a:ln>
-            <a:solidFill>
-              <a:srgbClr val="3465a4"/>
-            </a:solidFill>
-          </a:ln>
-        </p:spPr>
-        <p:style>
-          <a:lnRef idx="0"/>
-          <a:fillRef idx="0"/>
-          <a:effectRef idx="0"/>
-          <a:fontRef idx="minor"/>
-        </p:style>
-        <p:txBody>
-          <a:bodyPr wrap="none" lIns="90000" rIns="90000" tIns="45000" bIns="45000" anchor="ctr"/>
-          <a:p>
-            <a:pPr algn="ctr"/>
-            <a:r>
-              <a:rPr b="0" lang="en-US" sz="1800" spc="-1" strike="noStrike">
-                <a:solidFill>
-                  <a:srgbClr val="000000"/>
-                </a:solidFill>
-                <a:uFill>
-                  <a:solidFill>
-                    <a:srgbClr val="ffffff"/>
-                  </a:solidFill>
-                </a:uFill>
-                <a:latin typeface="Arial"/>
-              </a:rPr>
-              <a:t>Node 2</a:t>
-            </a:r>
-            <a:endParaRPr b="0" lang="en-US" sz="1800" spc="-1" strike="noStrike">
-              <a:solidFill>
-                <a:srgbClr val="000000"/>
-              </a:solidFill>
-              <a:uFill>
-                <a:solidFill>
-                  <a:srgbClr val="ffffff"/>
-                </a:solidFill>
-              </a:uFill>
-              <a:latin typeface="Arial"/>
-            </a:endParaRPr>
-          </a:p>
-        </p:txBody>
-      </p:sp>
-      <p:sp>
-        <p:nvSpPr>
-          <p:cNvPr id="116" name="CustomShape 7"/>
-          <p:cNvSpPr/>
-          <p:nvPr/>
-        </p:nvSpPr>
-        <p:spPr>
-          <a:xfrm>
-            <a:off x="7223760" y="6083640"/>
-            <a:ext cx="1920240" cy="822960"/>
-          </a:xfrm>
-          <a:prstGeom prst="rect">
-            <a:avLst/>
-          </a:prstGeom>
-          <a:noFill/>
-          <a:ln>
-            <a:solidFill>
-              <a:srgbClr val="3465a4"/>
-            </a:solidFill>
-          </a:ln>
-        </p:spPr>
-        <p:style>
-          <a:lnRef idx="0"/>
-          <a:fillRef idx="0"/>
-          <a:effectRef idx="0"/>
-          <a:fontRef idx="minor"/>
-        </p:style>
-        <p:txBody>
-          <a:bodyPr wrap="none" lIns="90000" rIns="90000" tIns="45000" bIns="45000" anchor="ctr"/>
-          <a:p>
-            <a:pPr algn="ctr"/>
-            <a:r>
-              <a:rPr b="0" lang="en-US" sz="1800" spc="-1" strike="noStrike">
-                <a:solidFill>
-                  <a:srgbClr val="000000"/>
-                </a:solidFill>
-                <a:uFill>
-                  <a:solidFill>
-                    <a:srgbClr val="ffffff"/>
-                  </a:solidFill>
-                </a:uFill>
-                <a:latin typeface="Arial"/>
-              </a:rPr>
-              <a:t>Node 3</a:t>
-            </a:r>
-            <a:endParaRPr b="0" lang="en-US" sz="1800" spc="-1" strike="noStrike">
-              <a:solidFill>
-                <a:srgbClr val="000000"/>
-              </a:solidFill>
-              <a:uFill>
-                <a:solidFill>
-                  <a:srgbClr val="ffffff"/>
-                </a:solidFill>
-              </a:uFill>
-              <a:latin typeface="Arial"/>
-            </a:endParaRPr>
-          </a:p>
-        </p:txBody>
-      </p:sp>
-      <p:cxnSp>
-        <p:nvCxnSpPr>
-          <p:cNvPr id="117" name="Line 8"/>
-          <p:cNvCxnSpPr/>
-          <p:nvPr/>
-        </p:nvCxnSpPr>
-        <p:spPr>
-          <a:xfrm>
-            <a:off x="0" y="0"/>
-            <a:ext cx="360" cy="360"/>
-          </a:xfrm>
-          <a:prstGeom prst="line">
-            <a:avLst/>
-          </a:prstGeom>
-          <a:ln>
-            <a:solidFill>
-              <a:srgbClr val="000000"/>
-            </a:solidFill>
-            <a:tailEnd len="med" type="triangle" w="med"/>
-          </a:ln>
-        </p:spPr>
-      </p:cxnSp>
-      <p:cxnSp>
-        <p:nvCxnSpPr>
-          <p:cNvPr id="118" name="Line 9"/>
-          <p:cNvCxnSpPr/>
-          <p:nvPr/>
-        </p:nvCxnSpPr>
-        <p:spPr>
-          <a:xfrm>
-            <a:off x="0" y="0"/>
-            <a:ext cx="360" cy="360"/>
-          </a:xfrm>
-          <a:prstGeom prst="line">
-            <a:avLst/>
-          </a:prstGeom>
-          <a:ln>
-            <a:solidFill>
-              <a:srgbClr val="000000"/>
-            </a:solidFill>
-            <a:tailEnd len="med" type="triangle" w="med"/>
-          </a:ln>
-        </p:spPr>
-      </p:cxnSp>
-      <p:cxnSp>
-        <p:nvCxnSpPr>
-          <p:cNvPr id="119" name="Line 10"/>
-          <p:cNvCxnSpPr/>
-          <p:nvPr/>
-        </p:nvCxnSpPr>
-        <p:spPr>
-          <a:xfrm>
-            <a:off x="0" y="0"/>
-            <a:ext cx="360" cy="360"/>
-          </a:xfrm>
-          <a:prstGeom prst="line">
-            <a:avLst/>
-          </a:prstGeom>
-          <a:ln>
-            <a:solidFill>
-              <a:srgbClr val="000000"/>
-            </a:solidFill>
-            <a:tailEnd len="med" type="triangle" w="med"/>
-          </a:ln>
-        </p:spPr>
-      </p:cxnSp>
-      <p:cxnSp>
-        <p:nvCxnSpPr>
-          <p:cNvPr id="120" name="Line 11"/>
-          <p:cNvCxnSpPr/>
-          <p:nvPr/>
-        </p:nvCxnSpPr>
-        <p:spPr>
-          <a:xfrm>
-            <a:off x="0" y="0"/>
-            <a:ext cx="360" cy="360"/>
-          </a:xfrm>
-          <a:prstGeom prst="line">
-            <a:avLst/>
-          </a:prstGeom>
-          <a:ln>
-            <a:solidFill>
-              <a:srgbClr val="000000"/>
-            </a:solidFill>
-            <a:tailEnd len="med" type="triangle" w="med"/>
-          </a:ln>
-        </p:spPr>
-      </p:cxnSp>
-      <p:sp>
-        <p:nvSpPr>
-          <p:cNvPr id="121" name="CustomShape 12"/>
-          <p:cNvSpPr/>
-          <p:nvPr/>
-        </p:nvSpPr>
-        <p:spPr>
-          <a:xfrm>
-            <a:off x="2322000" y="4803480"/>
-            <a:ext cx="914400" cy="1188720"/>
-          </a:xfrm>
-          <a:prstGeom prst="rect">
-            <a:avLst/>
-          </a:prstGeom>
-          <a:solidFill>
-            <a:srgbClr val="729fcf"/>
-          </a:solidFill>
-          <a:ln>
-            <a:solidFill>
-              <a:srgbClr val="3465a4"/>
-            </a:solidFill>
-          </a:ln>
-        </p:spPr>
-        <p:style>
-          <a:lnRef idx="0"/>
-          <a:fillRef idx="0"/>
-          <a:effectRef idx="0"/>
-          <a:fontRef idx="minor"/>
-        </p:style>
-        <p:txBody>
-          <a:bodyPr wrap="none" lIns="90000" rIns="90000" tIns="45000" bIns="45000" anchor="ctr"/>
-          <a:p>
-            <a:pPr algn="ctr"/>
-            <a:r>
-              <a:rPr b="0" lang="en-US" sz="1800" spc="-1" strike="noStrike">
-                <a:solidFill>
-                  <a:srgbClr val="000000"/>
-                </a:solidFill>
-                <a:uFill>
-                  <a:solidFill>
-                    <a:srgbClr val="ffffff"/>
-                  </a:solidFill>
-                </a:uFill>
-                <a:latin typeface="Arial"/>
-              </a:rPr>
-              <a:t>Calc</a:t>
-            </a:r>
-            <a:endParaRPr b="0" lang="en-US" sz="1800" spc="-1" strike="noStrike">
-              <a:solidFill>
-                <a:srgbClr val="000000"/>
-              </a:solidFill>
-              <a:uFill>
-                <a:solidFill>
-                  <a:srgbClr val="ffffff"/>
-                </a:solidFill>
-              </a:uFill>
-              <a:latin typeface="Arial"/>
-            </a:endParaRPr>
-          </a:p>
-          <a:p>
-            <a:pPr algn="ctr"/>
-            <a:r>
-              <a:rPr b="0" lang="en-US" sz="1800" spc="-1" strike="noStrike">
-                <a:solidFill>
-                  <a:srgbClr val="000000"/>
-                </a:solidFill>
-                <a:uFill>
-                  <a:solidFill>
-                    <a:srgbClr val="ffffff"/>
-                  </a:solidFill>
-                </a:uFill>
-                <a:latin typeface="Arial"/>
-              </a:rPr>
-              <a:t>Request</a:t>
-            </a:r>
-            <a:endParaRPr b="0" lang="en-US" sz="1800" spc="-1" strike="noStrike">
-              <a:solidFill>
-                <a:srgbClr val="000000"/>
-              </a:solidFill>
-              <a:uFill>
-                <a:solidFill>
-                  <a:srgbClr val="ffffff"/>
-                </a:solidFill>
-              </a:uFill>
-              <a:latin typeface="Arial"/>
-            </a:endParaRPr>
-          </a:p>
-        </p:txBody>
-      </p:sp>
-      <p:sp>
-        <p:nvSpPr>
-          <p:cNvPr id="122" name="CustomShape 13"/>
-          <p:cNvSpPr/>
-          <p:nvPr/>
-        </p:nvSpPr>
-        <p:spPr>
-          <a:xfrm>
-            <a:off x="8595360" y="6173640"/>
-            <a:ext cx="822960" cy="687240"/>
-          </a:xfrm>
-          <a:prstGeom prst="rect">
-            <a:avLst/>
-          </a:prstGeom>
-          <a:solidFill>
-            <a:srgbClr val="729fcf"/>
-          </a:solidFill>
-          <a:ln>
-            <a:solidFill>
-              <a:srgbClr val="3465a4"/>
-            </a:solidFill>
-          </a:ln>
-        </p:spPr>
-        <p:style>
-          <a:lnRef idx="0"/>
-          <a:fillRef idx="0"/>
-          <a:effectRef idx="0"/>
-          <a:fontRef idx="minor"/>
-        </p:style>
-        <p:txBody>
-          <a:bodyPr wrap="none" lIns="90000" rIns="90000" tIns="45000" bIns="45000" anchor="ctr"/>
-          <a:p>
-            <a:pPr algn="ctr"/>
-            <a:r>
-              <a:rPr b="0" lang="en-US" sz="1800" spc="-1" strike="noStrike">
-                <a:solidFill>
-                  <a:srgbClr val="000000"/>
-                </a:solidFill>
-                <a:uFill>
-                  <a:solidFill>
-                    <a:srgbClr val="ffffff"/>
-                  </a:solidFill>
-                </a:uFill>
-                <a:latin typeface="Arial"/>
-              </a:rPr>
-              <a:t>Calc on</a:t>
-            </a:r>
-            <a:endParaRPr b="0" lang="en-US" sz="1800" spc="-1" strike="noStrike">
-              <a:solidFill>
-                <a:srgbClr val="000000"/>
-              </a:solidFill>
-              <a:uFill>
-                <a:solidFill>
-                  <a:srgbClr val="ffffff"/>
-                </a:solidFill>
-              </a:uFill>
-              <a:latin typeface="Arial"/>
-            </a:endParaRPr>
-          </a:p>
-          <a:p>
-            <a:pPr algn="ctr"/>
-            <a:r>
-              <a:rPr b="0" lang="en-US" sz="1800" spc="-1" strike="noStrike">
-                <a:solidFill>
-                  <a:srgbClr val="000000"/>
-                </a:solidFill>
-                <a:uFill>
-                  <a:solidFill>
-                    <a:srgbClr val="ffffff"/>
-                  </a:solidFill>
-                </a:uFill>
-                <a:latin typeface="Arial"/>
-              </a:rPr>
-              <a:t>File_b</a:t>
-            </a:r>
-            <a:endParaRPr b="0" lang="en-US" sz="1800" spc="-1" strike="noStrike">
-              <a:solidFill>
-                <a:srgbClr val="000000"/>
-              </a:solidFill>
-              <a:uFill>
-                <a:solidFill>
-                  <a:srgbClr val="ffffff"/>
-                </a:solidFill>
-              </a:uFill>
-              <a:latin typeface="Arial"/>
-            </a:endParaRPr>
-          </a:p>
-        </p:txBody>
-      </p:sp>
-      <p:sp>
-        <p:nvSpPr>
-          <p:cNvPr id="123" name="CustomShape 14"/>
-          <p:cNvSpPr/>
-          <p:nvPr/>
-        </p:nvSpPr>
-        <p:spPr>
-          <a:xfrm>
-            <a:off x="8595360" y="3979080"/>
-            <a:ext cx="822960" cy="687240"/>
-          </a:xfrm>
-          <a:prstGeom prst="rect">
-            <a:avLst/>
-          </a:prstGeom>
-          <a:solidFill>
-            <a:srgbClr val="729fcf"/>
-          </a:solidFill>
-          <a:ln>
-            <a:solidFill>
-              <a:srgbClr val="3465a4"/>
-            </a:solidFill>
-          </a:ln>
-        </p:spPr>
-        <p:style>
-          <a:lnRef idx="0"/>
-          <a:fillRef idx="0"/>
-          <a:effectRef idx="0"/>
-          <a:fontRef idx="minor"/>
-        </p:style>
-        <p:txBody>
-          <a:bodyPr wrap="none" lIns="90000" rIns="90000" tIns="45000" bIns="45000" anchor="ctr"/>
-          <a:p>
-            <a:pPr algn="ctr"/>
-            <a:r>
-              <a:rPr b="0" lang="en-US" sz="1800" spc="-1" strike="noStrike">
-                <a:solidFill>
-                  <a:srgbClr val="000000"/>
-                </a:solidFill>
-                <a:uFill>
-                  <a:solidFill>
-                    <a:srgbClr val="ffffff"/>
-                  </a:solidFill>
-                </a:uFill>
-                <a:latin typeface="Arial"/>
-              </a:rPr>
-              <a:t>Calc on</a:t>
-            </a:r>
-            <a:endParaRPr b="0" lang="en-US" sz="1800" spc="-1" strike="noStrike">
-              <a:solidFill>
-                <a:srgbClr val="000000"/>
-              </a:solidFill>
-              <a:uFill>
-                <a:solidFill>
-                  <a:srgbClr val="ffffff"/>
-                </a:solidFill>
-              </a:uFill>
-              <a:latin typeface="Arial"/>
-            </a:endParaRPr>
-          </a:p>
-          <a:p>
-            <a:pPr algn="ctr"/>
-            <a:r>
-              <a:rPr b="0" lang="en-US" sz="1800" spc="-1" strike="noStrike">
-                <a:solidFill>
-                  <a:srgbClr val="000000"/>
-                </a:solidFill>
-                <a:uFill>
-                  <a:solidFill>
-                    <a:srgbClr val="ffffff"/>
-                  </a:solidFill>
-                </a:uFill>
-                <a:latin typeface="Arial"/>
-              </a:rPr>
-              <a:t>File_a</a:t>
-            </a:r>
-            <a:endParaRPr b="0" lang="en-US" sz="1800" spc="-1" strike="noStrike">
-              <a:solidFill>
-                <a:srgbClr val="000000"/>
-              </a:solidFill>
-              <a:uFill>
-                <a:solidFill>
-                  <a:srgbClr val="ffffff"/>
-                </a:solidFill>
-              </a:uFill>
-              <a:latin typeface="Arial"/>
-            </a:endParaRPr>
-          </a:p>
-        </p:txBody>
-      </p:sp>
-      <p:cxnSp>
-        <p:nvCxnSpPr>
-          <p:cNvPr id="124" name="Line 15"/>
-          <p:cNvCxnSpPr/>
-          <p:nvPr/>
-        </p:nvCxnSpPr>
-        <p:spPr>
-          <a:xfrm>
-            <a:off x="0" y="0"/>
-            <a:ext cx="360" cy="360"/>
-          </a:xfrm>
-          <a:prstGeom prst="line">
-            <a:avLst/>
-          </a:prstGeom>
-          <a:ln>
-            <a:solidFill>
-              <a:srgbClr val="000000"/>
-            </a:solidFill>
-            <a:tailEnd len="med" type="triangle" w="med"/>
-          </a:ln>
-        </p:spPr>
-      </p:cxnSp>
-      <p:cxnSp>
-        <p:nvCxnSpPr>
-          <p:cNvPr id="125" name="Line 16"/>
-          <p:cNvCxnSpPr/>
-          <p:nvPr/>
-        </p:nvCxnSpPr>
-        <p:spPr>
-          <a:xfrm>
-            <a:off x="0" y="0"/>
-            <a:ext cx="360" cy="360"/>
-          </a:xfrm>
-          <a:prstGeom prst="line">
-            <a:avLst/>
-          </a:prstGeom>
-          <a:ln>
-            <a:solidFill>
-              <a:srgbClr val="000000"/>
-            </a:solidFill>
-            <a:tailEnd len="med" type="triangle" w="med"/>
-          </a:ln>
-        </p:spPr>
-      </p:cxnSp>
+              <a:rPr b="0" lang="en-US" sz="3200" spc="-1" strike="noStrike">
+                <a:solidFill>
+                  <a:srgbClr val="000000"/>
+                </a:solidFill>
+                <a:uFill>
+                  <a:solidFill>
+                    <a:srgbClr val="ffffff"/>
+                  </a:solidFill>
+                </a:uFill>
+                <a:latin typeface="Arial"/>
+              </a:rPr>
+              <a:t>A </a:t>
+            </a:r>
+            <a:r>
+              <a:rPr b="0" lang="en-US" sz="3200" spc="-1" strike="noStrike">
+                <a:solidFill>
+                  <a:srgbClr val="ff3333"/>
+                </a:solidFill>
+                <a:uFill>
+                  <a:solidFill>
+                    <a:srgbClr val="ffffff"/>
+                  </a:solidFill>
+                </a:uFill>
+                <a:latin typeface="Arial"/>
+              </a:rPr>
+              <a:t>master node</a:t>
+            </a:r>
+            <a:r>
+              <a:rPr b="0" lang="en-US" sz="3200" spc="-1" strike="noStrike">
+                <a:solidFill>
+                  <a:srgbClr val="000000"/>
+                </a:solidFill>
+                <a:uFill>
+                  <a:solidFill>
+                    <a:srgbClr val="ffffff"/>
+                  </a:solidFill>
+                </a:uFill>
+                <a:latin typeface="Arial"/>
+              </a:rPr>
+              <a:t> connects the nodes and organizes the process execution across the cluster</a:t>
+            </a:r>
+            <a:endParaRPr b="0" lang="en-US" sz="3200" spc="-1" strike="noStrike">
+              <a:solidFill>
+                <a:srgbClr val="000000"/>
+              </a:solidFill>
+              <a:uFill>
+                <a:solidFill>
+                  <a:srgbClr val="ffffff"/>
+                </a:solidFill>
+              </a:uFill>
+              <a:latin typeface="Arial"/>
+            </a:endParaRPr>
+          </a:p>
+        </p:txBody>
+      </p:sp>
     </p:spTree>
   </p:cSld>
   <p:timing>
@@ -4031,7 +3307,7 @@
       </p:grpSpPr>
       <p:sp>
         <p:nvSpPr>
-          <p:cNvPr id="126" name="TextShape 1"/>
+          <p:cNvPr id="112" name="TextShape 1"/>
           <p:cNvSpPr txBox="1"/>
           <p:nvPr/>
         </p:nvSpPr>
@@ -4064,7 +3340,7 @@
                 </a:uFill>
                 <a:latin typeface="Arial"/>
               </a:rPr>
-              <a:t>MR: How Does it Work?</a:t>
+              <a:t>MR: How does it work?</a:t>
             </a:r>
             <a:endParaRPr b="0" lang="en-US" sz="4400" spc="-1" strike="noStrike">
               <a:solidFill>
@@ -4082,14 +3358,14 @@
       </p:sp>
       <p:sp>
         <p:nvSpPr>
-          <p:cNvPr id="127" name="TextShape 2"/>
+          <p:cNvPr id="113" name="TextShape 2"/>
           <p:cNvSpPr txBox="1"/>
           <p:nvPr/>
         </p:nvSpPr>
         <p:spPr>
           <a:xfrm>
-            <a:off x="504000" y="1682280"/>
-            <a:ext cx="9071640" cy="4557960"/>
+            <a:off x="504000" y="1328400"/>
+            <a:ext cx="9071640" cy="2379240"/>
           </a:xfrm>
           <a:prstGeom prst="rect">
             <a:avLst/>
@@ -4111,103 +3387,899 @@
               <a:buChar char=""/>
             </a:pPr>
             <a:r>
-              <a:rPr b="0" lang="en-US" sz="3200" spc="-1" strike="noStrike">
-                <a:solidFill>
-                  <a:srgbClr val="000000"/>
-                </a:solidFill>
-                <a:uFill>
-                  <a:solidFill>
-                    <a:srgbClr val="ffffff"/>
-                  </a:solidFill>
-                </a:uFill>
-                <a:latin typeface="Arial"/>
-              </a:rPr>
-              <a:t>Sometimes, on a distributed file system like GFS, calculations need to be done on the data that is stored. </a:t>
-            </a:r>
-            <a:endParaRPr b="0" lang="en-US" sz="3200" spc="-1" strike="noStrike">
-              <a:solidFill>
-                <a:srgbClr val="000000"/>
-              </a:solidFill>
-              <a:uFill>
-                <a:solidFill>
-                  <a:srgbClr val="ffffff"/>
-                </a:solidFill>
-              </a:uFill>
-              <a:latin typeface="Arial"/>
-            </a:endParaRPr>
-          </a:p>
-          <a:p>
-            <a:pPr marL="216000" indent="-216000">
+              <a:rPr b="0" lang="en-US" sz="2400" spc="-1" strike="noStrike">
+                <a:solidFill>
+                  <a:srgbClr val="000000"/>
+                </a:solidFill>
+                <a:uFill>
+                  <a:solidFill>
+                    <a:srgbClr val="ffffff"/>
+                  </a:solidFill>
+                </a:uFill>
+                <a:latin typeface="Arial"/>
+              </a:rPr>
+              <a:t>Calculation Request:</a:t>
+            </a:r>
+            <a:endParaRPr b="0" lang="en-US" sz="2400" spc="-1" strike="noStrike">
+              <a:solidFill>
+                <a:srgbClr val="000000"/>
+              </a:solidFill>
+              <a:uFill>
+                <a:solidFill>
+                  <a:srgbClr val="ffffff"/>
+                </a:solidFill>
+              </a:uFill>
+              <a:latin typeface="Arial"/>
+            </a:endParaRPr>
+          </a:p>
+          <a:p>
+            <a:pPr lvl="1" marL="432000" indent="-216000">
               <a:buClr>
                 <a:srgbClr val="000000"/>
               </a:buClr>
-              <a:buSzPct val="45000"/>
-              <a:buFont typeface="Wingdings" charset="2"/>
-              <a:buChar char=""/>
+              <a:buFont typeface="StarSymbol"/>
+              <a:buAutoNum type="arabicParenR"/>
             </a:pPr>
             <a:r>
-              <a:rPr b="0" lang="en-US" sz="3200" spc="-1" strike="noStrike">
-                <a:solidFill>
-                  <a:srgbClr val="000000"/>
-                </a:solidFill>
-                <a:uFill>
-                  <a:solidFill>
-                    <a:srgbClr val="ffffff"/>
-                  </a:solidFill>
-                </a:uFill>
-                <a:latin typeface="Arial"/>
-              </a:rPr>
-              <a:t>Traditionally, The files would have been served whole by GFS and then the operations would have taken place on the whole file. However, this can be very slow for large files</a:t>
-            </a:r>
-            <a:endParaRPr b="0" lang="en-US" sz="3200" spc="-1" strike="noStrike">
-              <a:solidFill>
-                <a:srgbClr val="000000"/>
-              </a:solidFill>
-              <a:uFill>
-                <a:solidFill>
-                  <a:srgbClr val="ffffff"/>
-                </a:solidFill>
-              </a:uFill>
-              <a:latin typeface="Arial"/>
-            </a:endParaRPr>
-          </a:p>
-          <a:p>
-            <a:pPr marL="216000" indent="-216000">
+              <a:rPr b="0" lang="en-US" sz="2400" spc="-1" strike="noStrike">
+                <a:solidFill>
+                  <a:srgbClr val="000000"/>
+                </a:solidFill>
+                <a:uFill>
+                  <a:solidFill>
+                    <a:srgbClr val="ffffff"/>
+                  </a:solidFill>
+                </a:uFill>
+                <a:latin typeface="Arial"/>
+              </a:rPr>
+              <a:t>Client asks the system for a calculation on some files that are on a distributed system</a:t>
+            </a:r>
+            <a:endParaRPr b="0" lang="en-US" sz="2400" spc="-1" strike="noStrike">
+              <a:solidFill>
+                <a:srgbClr val="000000"/>
+              </a:solidFill>
+              <a:uFill>
+                <a:solidFill>
+                  <a:srgbClr val="ffffff"/>
+                </a:solidFill>
+              </a:uFill>
+              <a:latin typeface="Arial"/>
+            </a:endParaRPr>
+          </a:p>
+          <a:p>
+            <a:pPr lvl="1" marL="432000" indent="-216000">
               <a:buClr>
                 <a:srgbClr val="000000"/>
               </a:buClr>
-              <a:buSzPct val="45000"/>
-              <a:buFont typeface="Wingdings" charset="2"/>
-              <a:buChar char=""/>
+              <a:buFont typeface="StarSymbol"/>
+              <a:buAutoNum type="arabicParenR"/>
             </a:pPr>
             <a:r>
-              <a:rPr b="0" lang="en-US" sz="3200" spc="-1" strike="noStrike">
-                <a:solidFill>
-                  <a:srgbClr val="000000"/>
-                </a:solidFill>
-                <a:uFill>
-                  <a:solidFill>
-                    <a:srgbClr val="ffffff"/>
-                  </a:solidFill>
-                </a:uFill>
-                <a:latin typeface="Arial"/>
-              </a:rPr>
-              <a:t>Again, instead of using a supercomputer, to do calculations, the calculations needed to be distributed. </a:t>
-            </a:r>
-            <a:endParaRPr b="0" lang="en-US" sz="3200" spc="-1" strike="noStrike">
-              <a:solidFill>
-                <a:srgbClr val="000000"/>
-              </a:solidFill>
-              <a:uFill>
-                <a:solidFill>
-                  <a:srgbClr val="ffffff"/>
-                </a:solidFill>
-              </a:uFill>
-              <a:latin typeface="Arial"/>
-            </a:endParaRPr>
-          </a:p>
-        </p:txBody>
-      </p:sp>
+              <a:rPr b="0" lang="en-US" sz="2400" spc="-1" strike="noStrike">
+                <a:solidFill>
+                  <a:srgbClr val="000000"/>
+                </a:solidFill>
+                <a:uFill>
+                  <a:solidFill>
+                    <a:srgbClr val="ffffff"/>
+                  </a:solidFill>
+                </a:uFill>
+                <a:latin typeface="Arial"/>
+              </a:rPr>
+              <a:t>Master node creates contacts the closest node with the correct file chunk(s)</a:t>
+            </a:r>
+            <a:endParaRPr b="0" lang="en-US" sz="2400" spc="-1" strike="noStrike">
+              <a:solidFill>
+                <a:srgbClr val="000000"/>
+              </a:solidFill>
+              <a:uFill>
+                <a:solidFill>
+                  <a:srgbClr val="ffffff"/>
+                </a:solidFill>
+              </a:uFill>
+              <a:latin typeface="Arial"/>
+            </a:endParaRPr>
+          </a:p>
+          <a:p>
+            <a:pPr lvl="1" marL="432000" indent="-216000">
+              <a:buClr>
+                <a:srgbClr val="000000"/>
+              </a:buClr>
+              <a:buFont typeface="StarSymbol"/>
+              <a:buAutoNum type="arabicParenR"/>
+            </a:pPr>
+            <a:r>
+              <a:rPr b="0" lang="en-US" sz="2400" spc="-1" strike="noStrike">
+                <a:solidFill>
+                  <a:srgbClr val="000000"/>
+                </a:solidFill>
+                <a:uFill>
+                  <a:solidFill>
+                    <a:srgbClr val="ffffff"/>
+                  </a:solidFill>
+                </a:uFill>
+                <a:latin typeface="Arial"/>
+              </a:rPr>
+              <a:t>The calculation code on the individual nodes executes the request on the file chunks and returns the results</a:t>
+            </a:r>
+            <a:endParaRPr b="0" lang="en-US" sz="2400" spc="-1" strike="noStrike">
+              <a:solidFill>
+                <a:srgbClr val="000000"/>
+              </a:solidFill>
+              <a:uFill>
+                <a:solidFill>
+                  <a:srgbClr val="ffffff"/>
+                </a:solidFill>
+              </a:uFill>
+              <a:latin typeface="Arial"/>
+            </a:endParaRPr>
+          </a:p>
+        </p:txBody>
+      </p:sp>
+      <p:sp>
+        <p:nvSpPr>
+          <p:cNvPr id="114" name="CustomShape 3"/>
+          <p:cNvSpPr/>
+          <p:nvPr/>
+        </p:nvSpPr>
+        <p:spPr>
+          <a:xfrm>
+            <a:off x="365760" y="4857480"/>
+            <a:ext cx="1828800" cy="1097280"/>
+          </a:xfrm>
+          <a:prstGeom prst="ellipse">
+            <a:avLst/>
+          </a:prstGeom>
+          <a:noFill/>
+          <a:ln>
+            <a:solidFill>
+              <a:srgbClr val="3465a4"/>
+            </a:solidFill>
+          </a:ln>
+        </p:spPr>
+        <p:style>
+          <a:lnRef idx="0"/>
+          <a:fillRef idx="0"/>
+          <a:effectRef idx="0"/>
+          <a:fontRef idx="minor"/>
+        </p:style>
+        <p:txBody>
+          <a:bodyPr wrap="none" lIns="90000" rIns="90000" tIns="45000" bIns="45000" anchor="ctr"/>
+          <a:p>
+            <a:pPr algn="ctr"/>
+            <a:r>
+              <a:rPr b="0" lang="en-US" sz="1800" spc="-1" strike="noStrike">
+                <a:solidFill>
+                  <a:srgbClr val="000000"/>
+                </a:solidFill>
+                <a:uFill>
+                  <a:solidFill>
+                    <a:srgbClr val="ffffff"/>
+                  </a:solidFill>
+                </a:uFill>
+                <a:latin typeface="Arial"/>
+              </a:rPr>
+              <a:t>Client(s)</a:t>
+            </a:r>
+            <a:endParaRPr b="0" lang="en-US" sz="1800" spc="-1" strike="noStrike">
+              <a:solidFill>
+                <a:srgbClr val="000000"/>
+              </a:solidFill>
+              <a:uFill>
+                <a:solidFill>
+                  <a:srgbClr val="ffffff"/>
+                </a:solidFill>
+              </a:uFill>
+              <a:latin typeface="Arial"/>
+            </a:endParaRPr>
+          </a:p>
+        </p:txBody>
+      </p:sp>
+      <p:sp>
+        <p:nvSpPr>
+          <p:cNvPr id="115" name="CustomShape 4"/>
+          <p:cNvSpPr/>
+          <p:nvPr/>
+        </p:nvSpPr>
+        <p:spPr>
+          <a:xfrm>
+            <a:off x="3566160" y="4674600"/>
+            <a:ext cx="2194560" cy="1482480"/>
+          </a:xfrm>
+          <a:prstGeom prst="rect">
+            <a:avLst/>
+          </a:prstGeom>
+          <a:noFill/>
+          <a:ln>
+            <a:solidFill>
+              <a:srgbClr val="3465a4"/>
+            </a:solidFill>
+          </a:ln>
+        </p:spPr>
+        <p:style>
+          <a:lnRef idx="0"/>
+          <a:fillRef idx="0"/>
+          <a:effectRef idx="0"/>
+          <a:fontRef idx="minor"/>
+        </p:style>
+        <p:txBody>
+          <a:bodyPr wrap="none" lIns="90000" rIns="90000" tIns="45000" bIns="45000" anchor="ctr"/>
+          <a:p>
+            <a:pPr algn="ctr"/>
+            <a:r>
+              <a:rPr b="0" lang="en-US" sz="1800" spc="-1" strike="noStrike">
+                <a:solidFill>
+                  <a:srgbClr val="000000"/>
+                </a:solidFill>
+                <a:uFill>
+                  <a:solidFill>
+                    <a:srgbClr val="ffffff"/>
+                  </a:solidFill>
+                </a:uFill>
+                <a:latin typeface="Arial"/>
+              </a:rPr>
+              <a:t>MASTER</a:t>
+            </a:r>
+            <a:endParaRPr b="0" lang="en-US" sz="1800" spc="-1" strike="noStrike">
+              <a:solidFill>
+                <a:srgbClr val="000000"/>
+              </a:solidFill>
+              <a:uFill>
+                <a:solidFill>
+                  <a:srgbClr val="ffffff"/>
+                </a:solidFill>
+              </a:uFill>
+              <a:latin typeface="Arial"/>
+            </a:endParaRPr>
+          </a:p>
+          <a:p>
+            <a:pPr algn="ctr"/>
+            <a:endParaRPr b="0" lang="en-US" sz="1800" spc="-1" strike="noStrike">
+              <a:solidFill>
+                <a:srgbClr val="000000"/>
+              </a:solidFill>
+              <a:uFill>
+                <a:solidFill>
+                  <a:srgbClr val="ffffff"/>
+                </a:solidFill>
+              </a:uFill>
+              <a:latin typeface="Arial"/>
+            </a:endParaRPr>
+          </a:p>
+          <a:p>
+            <a:pPr algn="ctr"/>
+            <a:r>
+              <a:rPr b="0" lang="en-US" sz="1800" spc="-1" strike="noStrike">
+                <a:solidFill>
+                  <a:srgbClr val="000000"/>
+                </a:solidFill>
+                <a:uFill>
+                  <a:solidFill>
+                    <a:srgbClr val="ffffff"/>
+                  </a:solidFill>
+                </a:uFill>
+                <a:latin typeface="Arial"/>
+              </a:rPr>
+              <a:t>File_a: Node 1</a:t>
+            </a:r>
+            <a:endParaRPr b="0" lang="en-US" sz="1800" spc="-1" strike="noStrike">
+              <a:solidFill>
+                <a:srgbClr val="000000"/>
+              </a:solidFill>
+              <a:uFill>
+                <a:solidFill>
+                  <a:srgbClr val="ffffff"/>
+                </a:solidFill>
+              </a:uFill>
+              <a:latin typeface="Arial"/>
+            </a:endParaRPr>
+          </a:p>
+          <a:p>
+            <a:pPr algn="ctr"/>
+            <a:r>
+              <a:rPr b="0" lang="en-US" sz="1800" spc="-1" strike="noStrike">
+                <a:solidFill>
+                  <a:srgbClr val="000000"/>
+                </a:solidFill>
+                <a:uFill>
+                  <a:solidFill>
+                    <a:srgbClr val="ffffff"/>
+                  </a:solidFill>
+                </a:uFill>
+                <a:latin typeface="Arial"/>
+              </a:rPr>
+              <a:t>File_b: Node 2</a:t>
+            </a:r>
+            <a:endParaRPr b="0" lang="en-US" sz="1800" spc="-1" strike="noStrike">
+              <a:solidFill>
+                <a:srgbClr val="000000"/>
+              </a:solidFill>
+              <a:uFill>
+                <a:solidFill>
+                  <a:srgbClr val="ffffff"/>
+                </a:solidFill>
+              </a:uFill>
+              <a:latin typeface="Arial"/>
+            </a:endParaRPr>
+          </a:p>
+        </p:txBody>
+      </p:sp>
+      <p:sp>
+        <p:nvSpPr>
+          <p:cNvPr id="116" name="CustomShape 5"/>
+          <p:cNvSpPr/>
+          <p:nvPr/>
+        </p:nvSpPr>
+        <p:spPr>
+          <a:xfrm>
+            <a:off x="7223760" y="3887640"/>
+            <a:ext cx="1920240" cy="822960"/>
+          </a:xfrm>
+          <a:prstGeom prst="rect">
+            <a:avLst/>
+          </a:prstGeom>
+          <a:noFill/>
+          <a:ln>
+            <a:solidFill>
+              <a:srgbClr val="3465a4"/>
+            </a:solidFill>
+          </a:ln>
+        </p:spPr>
+        <p:style>
+          <a:lnRef idx="0"/>
+          <a:fillRef idx="0"/>
+          <a:effectRef idx="0"/>
+          <a:fontRef idx="minor"/>
+        </p:style>
+        <p:txBody>
+          <a:bodyPr wrap="none" lIns="90000" rIns="90000" tIns="45000" bIns="45000" anchor="ctr"/>
+          <a:p>
+            <a:pPr algn="ctr"/>
+            <a:r>
+              <a:rPr b="0" lang="en-US" sz="1800" spc="-1" strike="noStrike">
+                <a:solidFill>
+                  <a:srgbClr val="000000"/>
+                </a:solidFill>
+                <a:uFill>
+                  <a:solidFill>
+                    <a:srgbClr val="ffffff"/>
+                  </a:solidFill>
+                </a:uFill>
+                <a:latin typeface="Arial"/>
+              </a:rPr>
+              <a:t>Node 1</a:t>
+            </a:r>
+            <a:endParaRPr b="0" lang="en-US" sz="1800" spc="-1" strike="noStrike">
+              <a:solidFill>
+                <a:srgbClr val="000000"/>
+              </a:solidFill>
+              <a:uFill>
+                <a:solidFill>
+                  <a:srgbClr val="ffffff"/>
+                </a:solidFill>
+              </a:uFill>
+              <a:latin typeface="Arial"/>
+            </a:endParaRPr>
+          </a:p>
+        </p:txBody>
+      </p:sp>
+      <p:sp>
+        <p:nvSpPr>
+          <p:cNvPr id="117" name="CustomShape 6"/>
+          <p:cNvSpPr/>
+          <p:nvPr/>
+        </p:nvSpPr>
+        <p:spPr>
+          <a:xfrm>
+            <a:off x="7223760" y="4984920"/>
+            <a:ext cx="1920240" cy="822960"/>
+          </a:xfrm>
+          <a:prstGeom prst="rect">
+            <a:avLst/>
+          </a:prstGeom>
+          <a:noFill/>
+          <a:ln>
+            <a:solidFill>
+              <a:srgbClr val="3465a4"/>
+            </a:solidFill>
+          </a:ln>
+        </p:spPr>
+        <p:style>
+          <a:lnRef idx="0"/>
+          <a:fillRef idx="0"/>
+          <a:effectRef idx="0"/>
+          <a:fontRef idx="minor"/>
+        </p:style>
+        <p:txBody>
+          <a:bodyPr wrap="none" lIns="90000" rIns="90000" tIns="45000" bIns="45000" anchor="ctr"/>
+          <a:p>
+            <a:pPr algn="ctr"/>
+            <a:r>
+              <a:rPr b="0" lang="en-US" sz="1800" spc="-1" strike="noStrike">
+                <a:solidFill>
+                  <a:srgbClr val="000000"/>
+                </a:solidFill>
+                <a:uFill>
+                  <a:solidFill>
+                    <a:srgbClr val="ffffff"/>
+                  </a:solidFill>
+                </a:uFill>
+                <a:latin typeface="Arial"/>
+              </a:rPr>
+              <a:t>Node 2</a:t>
+            </a:r>
+            <a:endParaRPr b="0" lang="en-US" sz="1800" spc="-1" strike="noStrike">
+              <a:solidFill>
+                <a:srgbClr val="000000"/>
+              </a:solidFill>
+              <a:uFill>
+                <a:solidFill>
+                  <a:srgbClr val="ffffff"/>
+                </a:solidFill>
+              </a:uFill>
+              <a:latin typeface="Arial"/>
+            </a:endParaRPr>
+          </a:p>
+        </p:txBody>
+      </p:sp>
+      <p:sp>
+        <p:nvSpPr>
+          <p:cNvPr id="118" name="CustomShape 7"/>
+          <p:cNvSpPr/>
+          <p:nvPr/>
+        </p:nvSpPr>
+        <p:spPr>
+          <a:xfrm>
+            <a:off x="7223760" y="6083640"/>
+            <a:ext cx="1920240" cy="822960"/>
+          </a:xfrm>
+          <a:prstGeom prst="rect">
+            <a:avLst/>
+          </a:prstGeom>
+          <a:noFill/>
+          <a:ln>
+            <a:solidFill>
+              <a:srgbClr val="3465a4"/>
+            </a:solidFill>
+          </a:ln>
+        </p:spPr>
+        <p:style>
+          <a:lnRef idx="0"/>
+          <a:fillRef idx="0"/>
+          <a:effectRef idx="0"/>
+          <a:fontRef idx="minor"/>
+        </p:style>
+        <p:txBody>
+          <a:bodyPr wrap="none" lIns="90000" rIns="90000" tIns="45000" bIns="45000" anchor="ctr"/>
+          <a:p>
+            <a:pPr algn="ctr"/>
+            <a:r>
+              <a:rPr b="0" lang="en-US" sz="1800" spc="-1" strike="noStrike">
+                <a:solidFill>
+                  <a:srgbClr val="000000"/>
+                </a:solidFill>
+                <a:uFill>
+                  <a:solidFill>
+                    <a:srgbClr val="ffffff"/>
+                  </a:solidFill>
+                </a:uFill>
+                <a:latin typeface="Arial"/>
+              </a:rPr>
+              <a:t>Node 3</a:t>
+            </a:r>
+            <a:endParaRPr b="0" lang="en-US" sz="1800" spc="-1" strike="noStrike">
+              <a:solidFill>
+                <a:srgbClr val="000000"/>
+              </a:solidFill>
+              <a:uFill>
+                <a:solidFill>
+                  <a:srgbClr val="ffffff"/>
+                </a:solidFill>
+              </a:uFill>
+              <a:latin typeface="Arial"/>
+            </a:endParaRPr>
+          </a:p>
+        </p:txBody>
+      </p:sp>
+      <p:cxnSp>
+        <p:nvCxnSpPr>
+          <p:cNvPr id="119" name="Line 8"/>
+          <p:cNvCxnSpPr/>
+          <p:nvPr/>
+        </p:nvCxnSpPr>
+        <p:spPr>
+          <a:xfrm>
+            <a:off x="0" y="0"/>
+            <a:ext cx="360" cy="360"/>
+          </a:xfrm>
+          <a:prstGeom prst="line">
+            <a:avLst/>
+          </a:prstGeom>
+          <a:ln>
+            <a:solidFill>
+              <a:srgbClr val="000000"/>
+            </a:solidFill>
+            <a:tailEnd len="med" type="triangle" w="med"/>
+          </a:ln>
+        </p:spPr>
+      </p:cxnSp>
+      <p:cxnSp>
+        <p:nvCxnSpPr>
+          <p:cNvPr id="120" name="Line 9"/>
+          <p:cNvCxnSpPr/>
+          <p:nvPr/>
+        </p:nvCxnSpPr>
+        <p:spPr>
+          <a:xfrm>
+            <a:off x="0" y="0"/>
+            <a:ext cx="360" cy="360"/>
+          </a:xfrm>
+          <a:prstGeom prst="line">
+            <a:avLst/>
+          </a:prstGeom>
+          <a:ln>
+            <a:solidFill>
+              <a:srgbClr val="000000"/>
+            </a:solidFill>
+            <a:tailEnd len="med" type="triangle" w="med"/>
+          </a:ln>
+        </p:spPr>
+      </p:cxnSp>
+      <p:cxnSp>
+        <p:nvCxnSpPr>
+          <p:cNvPr id="121" name="Line 10"/>
+          <p:cNvCxnSpPr/>
+          <p:nvPr/>
+        </p:nvCxnSpPr>
+        <p:spPr>
+          <a:xfrm>
+            <a:off x="0" y="0"/>
+            <a:ext cx="360" cy="360"/>
+          </a:xfrm>
+          <a:prstGeom prst="line">
+            <a:avLst/>
+          </a:prstGeom>
+          <a:ln>
+            <a:solidFill>
+              <a:srgbClr val="000000"/>
+            </a:solidFill>
+            <a:tailEnd len="med" type="triangle" w="med"/>
+          </a:ln>
+        </p:spPr>
+      </p:cxnSp>
+      <p:cxnSp>
+        <p:nvCxnSpPr>
+          <p:cNvPr id="122" name="Line 11"/>
+          <p:cNvCxnSpPr/>
+          <p:nvPr/>
+        </p:nvCxnSpPr>
+        <p:spPr>
+          <a:xfrm>
+            <a:off x="0" y="0"/>
+            <a:ext cx="360" cy="360"/>
+          </a:xfrm>
+          <a:prstGeom prst="line">
+            <a:avLst/>
+          </a:prstGeom>
+          <a:ln>
+            <a:solidFill>
+              <a:srgbClr val="000000"/>
+            </a:solidFill>
+            <a:tailEnd len="med" type="triangle" w="med"/>
+          </a:ln>
+        </p:spPr>
+      </p:cxnSp>
+      <p:sp>
+        <p:nvSpPr>
+          <p:cNvPr id="123" name="CustomShape 12"/>
+          <p:cNvSpPr/>
+          <p:nvPr/>
+        </p:nvSpPr>
+        <p:spPr>
+          <a:xfrm>
+            <a:off x="2322000" y="4803480"/>
+            <a:ext cx="914400" cy="1188720"/>
+          </a:xfrm>
+          <a:prstGeom prst="rect">
+            <a:avLst/>
+          </a:prstGeom>
+          <a:solidFill>
+            <a:srgbClr val="729fcf"/>
+          </a:solidFill>
+          <a:ln>
+            <a:solidFill>
+              <a:srgbClr val="3465a4"/>
+            </a:solidFill>
+          </a:ln>
+        </p:spPr>
+        <p:style>
+          <a:lnRef idx="0"/>
+          <a:fillRef idx="0"/>
+          <a:effectRef idx="0"/>
+          <a:fontRef idx="minor"/>
+        </p:style>
+        <p:txBody>
+          <a:bodyPr wrap="none" lIns="90000" rIns="90000" tIns="45000" bIns="45000" anchor="ctr"/>
+          <a:p>
+            <a:pPr algn="ctr"/>
+            <a:r>
+              <a:rPr b="0" lang="en-US" sz="1800" spc="-1" strike="noStrike">
+                <a:solidFill>
+                  <a:srgbClr val="000000"/>
+                </a:solidFill>
+                <a:uFill>
+                  <a:solidFill>
+                    <a:srgbClr val="ffffff"/>
+                  </a:solidFill>
+                </a:uFill>
+                <a:latin typeface="Arial"/>
+              </a:rPr>
+              <a:t>Calc</a:t>
+            </a:r>
+            <a:endParaRPr b="0" lang="en-US" sz="1800" spc="-1" strike="noStrike">
+              <a:solidFill>
+                <a:srgbClr val="000000"/>
+              </a:solidFill>
+              <a:uFill>
+                <a:solidFill>
+                  <a:srgbClr val="ffffff"/>
+                </a:solidFill>
+              </a:uFill>
+              <a:latin typeface="Arial"/>
+            </a:endParaRPr>
+          </a:p>
+          <a:p>
+            <a:pPr algn="ctr"/>
+            <a:r>
+              <a:rPr b="0" lang="en-US" sz="1800" spc="-1" strike="noStrike">
+                <a:solidFill>
+                  <a:srgbClr val="000000"/>
+                </a:solidFill>
+                <a:uFill>
+                  <a:solidFill>
+                    <a:srgbClr val="ffffff"/>
+                  </a:solidFill>
+                </a:uFill>
+                <a:latin typeface="Arial"/>
+              </a:rPr>
+              <a:t>Request</a:t>
+            </a:r>
+            <a:endParaRPr b="0" lang="en-US" sz="1800" spc="-1" strike="noStrike">
+              <a:solidFill>
+                <a:srgbClr val="000000"/>
+              </a:solidFill>
+              <a:uFill>
+                <a:solidFill>
+                  <a:srgbClr val="ffffff"/>
+                </a:solidFill>
+              </a:uFill>
+              <a:latin typeface="Arial"/>
+            </a:endParaRPr>
+          </a:p>
+        </p:txBody>
+      </p:sp>
+      <p:sp>
+        <p:nvSpPr>
+          <p:cNvPr id="124" name="CustomShape 13"/>
+          <p:cNvSpPr/>
+          <p:nvPr/>
+        </p:nvSpPr>
+        <p:spPr>
+          <a:xfrm>
+            <a:off x="8595360" y="6173640"/>
+            <a:ext cx="822960" cy="687240"/>
+          </a:xfrm>
+          <a:prstGeom prst="rect">
+            <a:avLst/>
+          </a:prstGeom>
+          <a:solidFill>
+            <a:srgbClr val="729fcf"/>
+          </a:solidFill>
+          <a:ln>
+            <a:solidFill>
+              <a:srgbClr val="3465a4"/>
+            </a:solidFill>
+          </a:ln>
+        </p:spPr>
+        <p:style>
+          <a:lnRef idx="0"/>
+          <a:fillRef idx="0"/>
+          <a:effectRef idx="0"/>
+          <a:fontRef idx="minor"/>
+        </p:style>
+        <p:txBody>
+          <a:bodyPr wrap="none" lIns="90000" rIns="90000" tIns="45000" bIns="45000" anchor="ctr"/>
+          <a:p>
+            <a:pPr algn="ctr"/>
+            <a:r>
+              <a:rPr b="0" lang="en-US" sz="1800" spc="-1" strike="noStrike">
+                <a:solidFill>
+                  <a:srgbClr val="000000"/>
+                </a:solidFill>
+                <a:uFill>
+                  <a:solidFill>
+                    <a:srgbClr val="ffffff"/>
+                  </a:solidFill>
+                </a:uFill>
+                <a:latin typeface="Arial"/>
+              </a:rPr>
+              <a:t>Calc on</a:t>
+            </a:r>
+            <a:endParaRPr b="0" lang="en-US" sz="1800" spc="-1" strike="noStrike">
+              <a:solidFill>
+                <a:srgbClr val="000000"/>
+              </a:solidFill>
+              <a:uFill>
+                <a:solidFill>
+                  <a:srgbClr val="ffffff"/>
+                </a:solidFill>
+              </a:uFill>
+              <a:latin typeface="Arial"/>
+            </a:endParaRPr>
+          </a:p>
+          <a:p>
+            <a:pPr algn="ctr"/>
+            <a:r>
+              <a:rPr b="0" lang="en-US" sz="1800" spc="-1" strike="noStrike">
+                <a:solidFill>
+                  <a:srgbClr val="000000"/>
+                </a:solidFill>
+                <a:uFill>
+                  <a:solidFill>
+                    <a:srgbClr val="ffffff"/>
+                  </a:solidFill>
+                </a:uFill>
+                <a:latin typeface="Arial"/>
+              </a:rPr>
+              <a:t>File_b</a:t>
+            </a:r>
+            <a:endParaRPr b="0" lang="en-US" sz="1800" spc="-1" strike="noStrike">
+              <a:solidFill>
+                <a:srgbClr val="000000"/>
+              </a:solidFill>
+              <a:uFill>
+                <a:solidFill>
+                  <a:srgbClr val="ffffff"/>
+                </a:solidFill>
+              </a:uFill>
+              <a:latin typeface="Arial"/>
+            </a:endParaRPr>
+          </a:p>
+        </p:txBody>
+      </p:sp>
+      <p:sp>
+        <p:nvSpPr>
+          <p:cNvPr id="125" name="CustomShape 14"/>
+          <p:cNvSpPr/>
+          <p:nvPr/>
+        </p:nvSpPr>
+        <p:spPr>
+          <a:xfrm>
+            <a:off x="8595360" y="3979080"/>
+            <a:ext cx="822960" cy="687240"/>
+          </a:xfrm>
+          <a:prstGeom prst="rect">
+            <a:avLst/>
+          </a:prstGeom>
+          <a:solidFill>
+            <a:srgbClr val="729fcf"/>
+          </a:solidFill>
+          <a:ln>
+            <a:solidFill>
+              <a:srgbClr val="3465a4"/>
+            </a:solidFill>
+          </a:ln>
+        </p:spPr>
+        <p:style>
+          <a:lnRef idx="0"/>
+          <a:fillRef idx="0"/>
+          <a:effectRef idx="0"/>
+          <a:fontRef idx="minor"/>
+        </p:style>
+        <p:txBody>
+          <a:bodyPr wrap="none" lIns="90000" rIns="90000" tIns="45000" bIns="45000" anchor="ctr"/>
+          <a:p>
+            <a:pPr algn="ctr"/>
+            <a:r>
+              <a:rPr b="0" lang="en-US" sz="1800" spc="-1" strike="noStrike">
+                <a:solidFill>
+                  <a:srgbClr val="000000"/>
+                </a:solidFill>
+                <a:uFill>
+                  <a:solidFill>
+                    <a:srgbClr val="ffffff"/>
+                  </a:solidFill>
+                </a:uFill>
+                <a:latin typeface="Arial"/>
+              </a:rPr>
+              <a:t>Calc on</a:t>
+            </a:r>
+            <a:endParaRPr b="0" lang="en-US" sz="1800" spc="-1" strike="noStrike">
+              <a:solidFill>
+                <a:srgbClr val="000000"/>
+              </a:solidFill>
+              <a:uFill>
+                <a:solidFill>
+                  <a:srgbClr val="ffffff"/>
+                </a:solidFill>
+              </a:uFill>
+              <a:latin typeface="Arial"/>
+            </a:endParaRPr>
+          </a:p>
+          <a:p>
+            <a:pPr algn="ctr"/>
+            <a:r>
+              <a:rPr b="0" lang="en-US" sz="1800" spc="-1" strike="noStrike">
+                <a:solidFill>
+                  <a:srgbClr val="000000"/>
+                </a:solidFill>
+                <a:uFill>
+                  <a:solidFill>
+                    <a:srgbClr val="ffffff"/>
+                  </a:solidFill>
+                </a:uFill>
+                <a:latin typeface="Arial"/>
+              </a:rPr>
+              <a:t>File_a</a:t>
+            </a:r>
+            <a:endParaRPr b="0" lang="en-US" sz="1800" spc="-1" strike="noStrike">
+              <a:solidFill>
+                <a:srgbClr val="000000"/>
+              </a:solidFill>
+              <a:uFill>
+                <a:solidFill>
+                  <a:srgbClr val="ffffff"/>
+                </a:solidFill>
+              </a:uFill>
+              <a:latin typeface="Arial"/>
+            </a:endParaRPr>
+          </a:p>
+        </p:txBody>
+      </p:sp>
+      <p:cxnSp>
+        <p:nvCxnSpPr>
+          <p:cNvPr id="126" name="Line 15"/>
+          <p:cNvCxnSpPr/>
+          <p:nvPr/>
+        </p:nvCxnSpPr>
+        <p:spPr>
+          <a:xfrm>
+            <a:off x="0" y="0"/>
+            <a:ext cx="360" cy="360"/>
+          </a:xfrm>
+          <a:prstGeom prst="line">
+            <a:avLst/>
+          </a:prstGeom>
+          <a:ln>
+            <a:solidFill>
+              <a:srgbClr val="000000"/>
+            </a:solidFill>
+            <a:tailEnd len="med" type="triangle" w="med"/>
+          </a:ln>
+        </p:spPr>
+      </p:cxnSp>
+      <p:cxnSp>
+        <p:nvCxnSpPr>
+          <p:cNvPr id="127" name="Line 16"/>
+          <p:cNvCxnSpPr/>
+          <p:nvPr/>
+        </p:nvCxnSpPr>
+        <p:spPr>
+          <a:xfrm>
+            <a:off x="0" y="0"/>
+            <a:ext cx="360" cy="360"/>
+          </a:xfrm>
+          <a:prstGeom prst="line">
+            <a:avLst/>
+          </a:prstGeom>
+          <a:ln>
+            <a:solidFill>
+              <a:srgbClr val="000000"/>
+            </a:solidFill>
+            <a:tailEnd len="med" type="triangle" w="med"/>
+          </a:ln>
+        </p:spPr>
+      </p:cxnSp>
     </p:spTree>
   </p:cSld>
   <p:timing>
@@ -4217,6 +4289,637 @@
           <p:childTnLst>
             <p:seq>
               <p:cTn id="28" nodeType="mainSeq"/>
+              <p:prevCondLst>
+                <p:cond delay="0" evt="onPrev">
+                  <p:tgtEl>
+                    <p:sldTgt/>
+                  </p:tgtEl>
+                </p:cond>
+              </p:prevCondLst>
+              <p:nextCondLst>
+                <p:cond delay="0" evt="onNext">
+                  <p:tgtEl>
+                    <p:sldTgt/>
+                  </p:tgtEl>
+                </p:cond>
+              </p:nextCondLst>
+            </p:seq>
+          </p:childTnLst>
+        </p:cTn>
+      </p:par>
+    </p:tnLst>
+  </p:timing>
+</p:sld>
+</file>
+
+<file path=ppt/slides/slide15.xml><?xml version="1.0" encoding="utf-8"?>
+<p:sld xmlns:a="http://schemas.openxmlformats.org/drawingml/2006/main" xmlns:p="http://schemas.openxmlformats.org/presentationml/2006/main" xmlns:r="http://schemas.openxmlformats.org/officeDocument/2006/relationships" xmlns:p14="http://schemas.microsoft.com/office/powerpoint/2010/main" xmlns:p15="http://schemas.microsoft.com/office/powerpoint/2012/main" xmlns:mc="http://schemas.openxmlformats.org/markup-compatibility/2006">
+  <p:cSld>
+    <p:spTree>
+      <p:nvGrpSpPr>
+        <p:cNvPr id="1" name=""/>
+        <p:cNvGrpSpPr/>
+        <p:nvPr/>
+      </p:nvGrpSpPr>
+      <p:grpSpPr>
+        <a:xfrm>
+          <a:off x="0" y="0"/>
+          <a:ext cx="0" cy="0"/>
+          <a:chOff x="0" y="0"/>
+          <a:chExt cx="0" cy="0"/>
+        </a:xfrm>
+      </p:grpSpPr>
+      <p:sp>
+        <p:nvSpPr>
+          <p:cNvPr id="128" name="TextShape 1"/>
+          <p:cNvSpPr txBox="1"/>
+          <p:nvPr/>
+        </p:nvSpPr>
+        <p:spPr>
+          <a:xfrm>
+            <a:off x="504000" y="301320"/>
+            <a:ext cx="9071640" cy="1262160"/>
+          </a:xfrm>
+          <a:prstGeom prst="rect">
+            <a:avLst/>
+          </a:prstGeom>
+          <a:noFill/>
+          <a:ln>
+            <a:noFill/>
+          </a:ln>
+        </p:spPr>
+        <p:txBody>
+          <a:bodyPr lIns="0" rIns="0" tIns="0" bIns="0" anchor="ctr"/>
+          <a:p>
+            <a:pPr algn="ctr"/>
+            <a:r>
+              <a:rPr b="0" lang="en-US" sz="4400" spc="-1" strike="noStrike">
+                <a:solidFill>
+                  <a:srgbClr val="000000"/>
+                </a:solidFill>
+                <a:uFill>
+                  <a:solidFill>
+                    <a:srgbClr val="ffffff"/>
+                  </a:solidFill>
+                </a:uFill>
+                <a:latin typeface="Arial"/>
+              </a:rPr>
+              <a:t>MR: How Does it Work?</a:t>
+            </a:r>
+            <a:endParaRPr b="0" lang="en-US" sz="4400" spc="-1" strike="noStrike">
+              <a:solidFill>
+                <a:srgbClr val="000000"/>
+              </a:solidFill>
+              <a:uFill>
+                <a:solidFill>
+                  <a:srgbClr val="ffffff"/>
+                </a:solidFill>
+              </a:uFill>
+              <a:latin typeface="Arial"/>
+            </a:endParaRPr>
+          </a:p>
+        </p:txBody>
+      </p:sp>
+      <p:sp>
+        <p:nvSpPr>
+          <p:cNvPr id="129" name="TextShape 2"/>
+          <p:cNvSpPr txBox="1"/>
+          <p:nvPr/>
+        </p:nvSpPr>
+        <p:spPr>
+          <a:xfrm>
+            <a:off x="504000" y="1388520"/>
+            <a:ext cx="9071640" cy="5469480"/>
+          </a:xfrm>
+          <a:prstGeom prst="rect">
+            <a:avLst/>
+          </a:prstGeom>
+          <a:noFill/>
+          <a:ln>
+            <a:noFill/>
+          </a:ln>
+        </p:spPr>
+        <p:txBody>
+          <a:bodyPr lIns="0" rIns="0" tIns="0" bIns="0" anchor="ctr"/>
+          <a:p>
+            <a:pPr marL="216000" indent="-216000">
+              <a:buClr>
+                <a:srgbClr val="000000"/>
+              </a:buClr>
+              <a:buSzPct val="45000"/>
+              <a:buFont typeface="Wingdings" charset="2"/>
+              <a:buChar char=""/>
+            </a:pPr>
+            <a:r>
+              <a:rPr b="0" lang="en-US" sz="3200" spc="-1" strike="noStrike">
+                <a:solidFill>
+                  <a:srgbClr val="000000"/>
+                </a:solidFill>
+                <a:uFill>
+                  <a:solidFill>
+                    <a:srgbClr val="ffffff"/>
+                  </a:solidFill>
+                </a:uFill>
+                <a:latin typeface="Arial"/>
+              </a:rPr>
+              <a:t>Calculation Request: Example</a:t>
+            </a:r>
+            <a:endParaRPr b="0" lang="en-US" sz="3200" spc="-1" strike="noStrike">
+              <a:solidFill>
+                <a:srgbClr val="000000"/>
+              </a:solidFill>
+              <a:uFill>
+                <a:solidFill>
+                  <a:srgbClr val="ffffff"/>
+                </a:solidFill>
+              </a:uFill>
+              <a:latin typeface="Arial"/>
+            </a:endParaRPr>
+          </a:p>
+          <a:p>
+            <a:pPr lvl="1" marL="432000" indent="-216000">
+              <a:buClr>
+                <a:srgbClr val="000000"/>
+              </a:buClr>
+              <a:buSzPct val="45000"/>
+              <a:buFont typeface="Wingdings" charset="2"/>
+              <a:buChar char=""/>
+            </a:pPr>
+            <a:r>
+              <a:rPr b="0" lang="en-US" sz="3200" spc="-1" strike="noStrike">
+                <a:solidFill>
+                  <a:srgbClr val="000000"/>
+                </a:solidFill>
+                <a:uFill>
+                  <a:solidFill>
+                    <a:srgbClr val="ffffff"/>
+                  </a:solidFill>
+                </a:uFill>
+                <a:latin typeface="Arial"/>
+              </a:rPr>
+              <a:t>Suppose we want to query a distributed file for the word  ‘dog’</a:t>
+            </a:r>
+            <a:endParaRPr b="0" lang="en-US" sz="3200" spc="-1" strike="noStrike">
+              <a:solidFill>
+                <a:srgbClr val="000000"/>
+              </a:solidFill>
+              <a:uFill>
+                <a:solidFill>
+                  <a:srgbClr val="ffffff"/>
+                </a:solidFill>
+              </a:uFill>
+              <a:latin typeface="Arial"/>
+            </a:endParaRPr>
+          </a:p>
+          <a:p>
+            <a:pPr lvl="1" marL="432000" indent="-216000">
+              <a:buClr>
+                <a:srgbClr val="000000"/>
+              </a:buClr>
+              <a:buSzPct val="45000"/>
+              <a:buFont typeface="Wingdings" charset="2"/>
+              <a:buChar char=""/>
+            </a:pPr>
+            <a:r>
+              <a:rPr b="0" lang="en-US" sz="3200" spc="-1" strike="noStrike">
+                <a:solidFill>
+                  <a:srgbClr val="000000"/>
+                </a:solidFill>
+                <a:uFill>
+                  <a:solidFill>
+                    <a:srgbClr val="ffffff"/>
+                  </a:solidFill>
+                </a:uFill>
+                <a:latin typeface="Arial"/>
+              </a:rPr>
+              <a:t>The client would send its request to the Master node</a:t>
+            </a:r>
+            <a:endParaRPr b="0" lang="en-US" sz="3200" spc="-1" strike="noStrike">
+              <a:solidFill>
+                <a:srgbClr val="000000"/>
+              </a:solidFill>
+              <a:uFill>
+                <a:solidFill>
+                  <a:srgbClr val="ffffff"/>
+                </a:solidFill>
+              </a:uFill>
+              <a:latin typeface="Arial"/>
+            </a:endParaRPr>
+          </a:p>
+          <a:p>
+            <a:pPr lvl="1" marL="432000" indent="-216000">
+              <a:buClr>
+                <a:srgbClr val="000000"/>
+              </a:buClr>
+              <a:buSzPct val="45000"/>
+              <a:buFont typeface="Wingdings" charset="2"/>
+              <a:buChar char=""/>
+            </a:pPr>
+            <a:r>
+              <a:rPr b="0" lang="en-US" sz="3200" spc="-1" strike="noStrike">
+                <a:solidFill>
+                  <a:srgbClr val="000000"/>
+                </a:solidFill>
+                <a:uFill>
+                  <a:solidFill>
+                    <a:srgbClr val="ffffff"/>
+                  </a:solidFill>
+                </a:uFill>
+                <a:latin typeface="Arial"/>
+              </a:rPr>
+              <a:t>The Master node would reference the appropriate nodes that contain the file chunks</a:t>
+            </a:r>
+            <a:endParaRPr b="0" lang="en-US" sz="3200" spc="-1" strike="noStrike">
+              <a:solidFill>
+                <a:srgbClr val="000000"/>
+              </a:solidFill>
+              <a:uFill>
+                <a:solidFill>
+                  <a:srgbClr val="ffffff"/>
+                </a:solidFill>
+              </a:uFill>
+              <a:latin typeface="Arial"/>
+            </a:endParaRPr>
+          </a:p>
+          <a:p>
+            <a:pPr lvl="1" marL="432000" indent="-216000">
+              <a:buClr>
+                <a:srgbClr val="000000"/>
+              </a:buClr>
+              <a:buSzPct val="45000"/>
+              <a:buFont typeface="Wingdings" charset="2"/>
+              <a:buChar char=""/>
+            </a:pPr>
+            <a:r>
+              <a:rPr b="0" lang="en-US" sz="3200" spc="-1" strike="noStrike">
+                <a:solidFill>
+                  <a:srgbClr val="000000"/>
+                </a:solidFill>
+                <a:uFill>
+                  <a:solidFill>
+                    <a:srgbClr val="ffffff"/>
+                  </a:solidFill>
+                </a:uFill>
+                <a:latin typeface="Arial"/>
+              </a:rPr>
+              <a:t>The nodes would then execute the search for the word dog on the file chunks in question</a:t>
+            </a:r>
+            <a:endParaRPr b="0" lang="en-US" sz="3200" spc="-1" strike="noStrike">
+              <a:solidFill>
+                <a:srgbClr val="000000"/>
+              </a:solidFill>
+              <a:uFill>
+                <a:solidFill>
+                  <a:srgbClr val="ffffff"/>
+                </a:solidFill>
+              </a:uFill>
+              <a:latin typeface="Arial"/>
+            </a:endParaRPr>
+          </a:p>
+          <a:p>
+            <a:pPr lvl="1" marL="432000" indent="-216000">
+              <a:buClr>
+                <a:srgbClr val="000000"/>
+              </a:buClr>
+              <a:buSzPct val="45000"/>
+              <a:buFont typeface="Wingdings" charset="2"/>
+              <a:buChar char=""/>
+            </a:pPr>
+            <a:r>
+              <a:rPr b="0" lang="en-US" sz="3200" spc="-1" strike="noStrike">
+                <a:solidFill>
+                  <a:srgbClr val="000000"/>
+                </a:solidFill>
+                <a:uFill>
+                  <a:solidFill>
+                    <a:srgbClr val="ffffff"/>
+                  </a:solidFill>
+                </a:uFill>
+                <a:latin typeface="Arial"/>
+              </a:rPr>
+              <a:t>The results would be passed back to the master node and combined before returning the final results of to the client</a:t>
+            </a:r>
+            <a:endParaRPr b="0" lang="en-US" sz="3200" spc="-1" strike="noStrike">
+              <a:solidFill>
+                <a:srgbClr val="000000"/>
+              </a:solidFill>
+              <a:uFill>
+                <a:solidFill>
+                  <a:srgbClr val="ffffff"/>
+                </a:solidFill>
+              </a:uFill>
+              <a:latin typeface="Arial"/>
+            </a:endParaRPr>
+          </a:p>
+        </p:txBody>
+      </p:sp>
+    </p:spTree>
+  </p:cSld>
+  <p:timing>
+    <p:tnLst>
+      <p:par>
+        <p:cTn id="29" dur="indefinite" restart="never" nodeType="tmRoot">
+          <p:childTnLst>
+            <p:seq>
+              <p:cTn id="30" nodeType="mainSeq"/>
+              <p:prevCondLst>
+                <p:cond delay="0" evt="onPrev">
+                  <p:tgtEl>
+                    <p:sldTgt/>
+                  </p:tgtEl>
+                </p:cond>
+              </p:prevCondLst>
+              <p:nextCondLst>
+                <p:cond delay="0" evt="onNext">
+                  <p:tgtEl>
+                    <p:sldTgt/>
+                  </p:tgtEl>
+                </p:cond>
+              </p:nextCondLst>
+            </p:seq>
+          </p:childTnLst>
+        </p:cTn>
+      </p:par>
+    </p:tnLst>
+  </p:timing>
+</p:sld>
+</file>
+
+<file path=ppt/slides/slide16.xml><?xml version="1.0" encoding="utf-8"?>
+<p:sld xmlns:a="http://schemas.openxmlformats.org/drawingml/2006/main" xmlns:p="http://schemas.openxmlformats.org/presentationml/2006/main" xmlns:r="http://schemas.openxmlformats.org/officeDocument/2006/relationships" xmlns:p14="http://schemas.microsoft.com/office/powerpoint/2010/main" xmlns:p15="http://schemas.microsoft.com/office/powerpoint/2012/main" xmlns:mc="http://schemas.openxmlformats.org/markup-compatibility/2006">
+  <p:cSld>
+    <p:spTree>
+      <p:nvGrpSpPr>
+        <p:cNvPr id="1" name=""/>
+        <p:cNvGrpSpPr/>
+        <p:nvPr/>
+      </p:nvGrpSpPr>
+      <p:grpSpPr>
+        <a:xfrm>
+          <a:off x="0" y="0"/>
+          <a:ext cx="0" cy="0"/>
+          <a:chOff x="0" y="0"/>
+          <a:chExt cx="0" cy="0"/>
+        </a:xfrm>
+      </p:grpSpPr>
+      <p:sp>
+        <p:nvSpPr>
+          <p:cNvPr id="130" name="TextShape 1"/>
+          <p:cNvSpPr txBox="1"/>
+          <p:nvPr/>
+        </p:nvSpPr>
+        <p:spPr>
+          <a:xfrm>
+            <a:off x="504000" y="301320"/>
+            <a:ext cx="9071640" cy="1262160"/>
+          </a:xfrm>
+          <a:prstGeom prst="rect">
+            <a:avLst/>
+          </a:prstGeom>
+          <a:noFill/>
+          <a:ln>
+            <a:noFill/>
+          </a:ln>
+        </p:spPr>
+        <p:txBody>
+          <a:bodyPr lIns="0" rIns="0" tIns="0" bIns="0" anchor="ctr"/>
+          <a:p>
+            <a:pPr algn="ctr"/>
+            <a:r>
+              <a:rPr b="0" lang="en-US" sz="4400" spc="-1" strike="noStrike">
+                <a:solidFill>
+                  <a:srgbClr val="000000"/>
+                </a:solidFill>
+                <a:uFill>
+                  <a:solidFill>
+                    <a:srgbClr val="ffffff"/>
+                  </a:solidFill>
+                </a:uFill>
+                <a:latin typeface="Arial"/>
+              </a:rPr>
+              <a:t>MR: Fault Tolerance</a:t>
+            </a:r>
+            <a:endParaRPr b="0" lang="en-US" sz="4400" spc="-1" strike="noStrike">
+              <a:solidFill>
+                <a:srgbClr val="000000"/>
+              </a:solidFill>
+              <a:uFill>
+                <a:solidFill>
+                  <a:srgbClr val="ffffff"/>
+                </a:solidFill>
+              </a:uFill>
+              <a:latin typeface="Arial"/>
+            </a:endParaRPr>
+          </a:p>
+        </p:txBody>
+      </p:sp>
+      <p:sp>
+        <p:nvSpPr>
+          <p:cNvPr id="131" name="TextShape 2"/>
+          <p:cNvSpPr txBox="1"/>
+          <p:nvPr/>
+        </p:nvSpPr>
+        <p:spPr>
+          <a:xfrm>
+            <a:off x="504000" y="1479960"/>
+            <a:ext cx="9071640" cy="5469480"/>
+          </a:xfrm>
+          <a:prstGeom prst="rect">
+            <a:avLst/>
+          </a:prstGeom>
+          <a:noFill/>
+          <a:ln>
+            <a:noFill/>
+          </a:ln>
+        </p:spPr>
+        <p:txBody>
+          <a:bodyPr lIns="0" rIns="0" tIns="0" bIns="0" anchor="ctr"/>
+          <a:p>
+            <a:pPr marL="216000" indent="-216000">
+              <a:buClr>
+                <a:srgbClr val="000000"/>
+              </a:buClr>
+              <a:buSzPct val="45000"/>
+              <a:buFont typeface="Wingdings" charset="2"/>
+              <a:buChar char=""/>
+            </a:pPr>
+            <a:r>
+              <a:rPr b="0" lang="en-US" sz="3200" spc="-1" strike="noStrike">
+                <a:solidFill>
+                  <a:srgbClr val="000000"/>
+                </a:solidFill>
+                <a:uFill>
+                  <a:solidFill>
+                    <a:srgbClr val="ffffff"/>
+                  </a:solidFill>
+                </a:uFill>
+                <a:latin typeface="Arial"/>
+              </a:rPr>
+              <a:t>What happens when a node fails to execute a calculation?</a:t>
+            </a:r>
+            <a:endParaRPr b="0" lang="en-US" sz="3200" spc="-1" strike="noStrike">
+              <a:solidFill>
+                <a:srgbClr val="000000"/>
+              </a:solidFill>
+              <a:uFill>
+                <a:solidFill>
+                  <a:srgbClr val="ffffff"/>
+                </a:solidFill>
+              </a:uFill>
+              <a:latin typeface="Arial"/>
+            </a:endParaRPr>
+          </a:p>
+          <a:p>
+            <a:pPr lvl="2" marL="648000" indent="-216000">
+              <a:buClr>
+                <a:srgbClr val="000000"/>
+              </a:buClr>
+              <a:buSzPct val="45000"/>
+              <a:buFont typeface="Wingdings" charset="2"/>
+              <a:buChar char=""/>
+            </a:pPr>
+            <a:r>
+              <a:rPr b="0" lang="en-US" sz="3200" spc="-1" strike="noStrike">
+                <a:solidFill>
+                  <a:srgbClr val="000000"/>
+                </a:solidFill>
+                <a:uFill>
+                  <a:solidFill>
+                    <a:srgbClr val="ffffff"/>
+                  </a:solidFill>
+                </a:uFill>
+                <a:latin typeface="Arial"/>
+              </a:rPr>
+              <a:t>When a calculation is requested over a distributed system, it has several duplicate file chunks to process the results from</a:t>
+            </a:r>
+            <a:endParaRPr b="0" lang="en-US" sz="3200" spc="-1" strike="noStrike">
+              <a:solidFill>
+                <a:srgbClr val="000000"/>
+              </a:solidFill>
+              <a:uFill>
+                <a:solidFill>
+                  <a:srgbClr val="ffffff"/>
+                </a:solidFill>
+              </a:uFill>
+              <a:latin typeface="Arial"/>
+            </a:endParaRPr>
+          </a:p>
+          <a:p>
+            <a:pPr lvl="2" marL="648000" indent="-216000">
+              <a:buClr>
+                <a:srgbClr val="000000"/>
+              </a:buClr>
+              <a:buSzPct val="45000"/>
+              <a:buFont typeface="Wingdings" charset="2"/>
+              <a:buChar char=""/>
+            </a:pPr>
+            <a:r>
+              <a:rPr b="0" lang="en-US" sz="3200" spc="-1" strike="noStrike">
+                <a:solidFill>
+                  <a:srgbClr val="000000"/>
+                </a:solidFill>
+                <a:uFill>
+                  <a:solidFill>
+                    <a:srgbClr val="ffffff"/>
+                  </a:solidFill>
+                </a:uFill>
+                <a:latin typeface="Arial"/>
+              </a:rPr>
+              <a:t>If a failure on one node occurs when executing a calculation on a chunk, there are other nodes that will now have the data store in duplicate for it to execute on</a:t>
+            </a:r>
+            <a:endParaRPr b="0" lang="en-US" sz="3200" spc="-1" strike="noStrike">
+              <a:solidFill>
+                <a:srgbClr val="000000"/>
+              </a:solidFill>
+              <a:uFill>
+                <a:solidFill>
+                  <a:srgbClr val="ffffff"/>
+                </a:solidFill>
+              </a:uFill>
+              <a:latin typeface="Arial"/>
+            </a:endParaRPr>
+          </a:p>
+          <a:p>
+            <a:pPr lvl="2" marL="648000" indent="-216000">
+              <a:buClr>
+                <a:srgbClr val="000000"/>
+              </a:buClr>
+              <a:buSzPct val="45000"/>
+              <a:buFont typeface="Wingdings" charset="2"/>
+              <a:buChar char=""/>
+            </a:pPr>
+            <a:r>
+              <a:rPr b="0" lang="en-US" sz="3200" spc="-1" strike="noStrike">
+                <a:solidFill>
+                  <a:srgbClr val="000000"/>
+                </a:solidFill>
+                <a:uFill>
+                  <a:solidFill>
+                    <a:srgbClr val="ffffff"/>
+                  </a:solidFill>
+                </a:uFill>
+                <a:latin typeface="Arial"/>
+              </a:rPr>
+              <a:t>These supplementary nodes can now process the data on duplicate chunks when needed</a:t>
+            </a:r>
+            <a:endParaRPr b="0" lang="en-US" sz="3200" spc="-1" strike="noStrike">
+              <a:solidFill>
+                <a:srgbClr val="000000"/>
+              </a:solidFill>
+              <a:uFill>
+                <a:solidFill>
+                  <a:srgbClr val="ffffff"/>
+                </a:solidFill>
+              </a:uFill>
+              <a:latin typeface="Arial"/>
+            </a:endParaRPr>
+          </a:p>
+          <a:p>
+            <a:pPr marL="216000" indent="-216000">
+              <a:buClr>
+                <a:srgbClr val="000000"/>
+              </a:buClr>
+              <a:buSzPct val="45000"/>
+              <a:buFont typeface="Wingdings" charset="2"/>
+              <a:buChar char=""/>
+            </a:pPr>
+            <a:r>
+              <a:rPr b="0" lang="en-US" sz="3200" spc="-1" strike="noStrike">
+                <a:solidFill>
+                  <a:srgbClr val="000000"/>
+                </a:solidFill>
+                <a:uFill>
+                  <a:solidFill>
+                    <a:srgbClr val="ffffff"/>
+                  </a:solidFill>
+                </a:uFill>
+                <a:latin typeface="Arial"/>
+              </a:rPr>
+              <a:t> </a:t>
+            </a:r>
+            <a:endParaRPr b="0" lang="en-US" sz="3200" spc="-1" strike="noStrike">
+              <a:solidFill>
+                <a:srgbClr val="000000"/>
+              </a:solidFill>
+              <a:uFill>
+                <a:solidFill>
+                  <a:srgbClr val="ffffff"/>
+                </a:solidFill>
+              </a:uFill>
+              <a:latin typeface="Arial"/>
+            </a:endParaRPr>
+          </a:p>
+        </p:txBody>
+      </p:sp>
+    </p:spTree>
+  </p:cSld>
+  <p:timing>
+    <p:tnLst>
+      <p:par>
+        <p:cTn id="31" dur="indefinite" restart="never" nodeType="tmRoot">
+          <p:childTnLst>
+            <p:seq>
+              <p:cTn id="32" nodeType="mainSeq"/>
               <p:prevCondLst>
                 <p:cond delay="0" evt="onPrev">
                   <p:tgtEl>

</xml_diff>